<commit_message>
final ppt and final video
</commit_message>
<xml_diff>
--- a/video-presentation/final-presentation.pptx
+++ b/video-presentation/final-presentation.pptx
@@ -5,7 +5,7 @@
     <p:sldMasterId id="2147483648" r:id="rId1"/>
   </p:sldMasterIdLst>
   <p:notesMasterIdLst>
-    <p:notesMasterId r:id="rId40"/>
+    <p:notesMasterId r:id="rId49"/>
   </p:notesMasterIdLst>
   <p:sldIdLst>
     <p:sldId id="256" r:id="rId2"/>
@@ -44,8 +44,17 @@
     <p:sldId id="291" r:id="rId35"/>
     <p:sldId id="292" r:id="rId36"/>
     <p:sldId id="293" r:id="rId37"/>
-    <p:sldId id="294" r:id="rId38"/>
-    <p:sldId id="295" r:id="rId39"/>
+    <p:sldId id="305" r:id="rId38"/>
+    <p:sldId id="299" r:id="rId39"/>
+    <p:sldId id="306" r:id="rId40"/>
+    <p:sldId id="307" r:id="rId41"/>
+    <p:sldId id="308" r:id="rId42"/>
+    <p:sldId id="303" r:id="rId43"/>
+    <p:sldId id="309" r:id="rId44"/>
+    <p:sldId id="294" r:id="rId45"/>
+    <p:sldId id="310" r:id="rId46"/>
+    <p:sldId id="304" r:id="rId47"/>
+    <p:sldId id="298" r:id="rId48"/>
   </p:sldIdLst>
   <p:sldSz cx="12192000" cy="6858000"/>
   <p:notesSz cx="6858000" cy="9144000"/>
@@ -3375,6 +3384,582 @@
 </p:notes>
 </file>
 
+<file path=ppt/notesSlides/notesSlide34.xml><?xml version="1.0" encoding="utf-8"?>
+<p:notes xmlns:a="http://schemas.openxmlformats.org/drawingml/2006/main" xmlns:r="http://schemas.openxmlformats.org/officeDocument/2006/relationships" xmlns:p="http://schemas.openxmlformats.org/presentationml/2006/main">
+  <p:cSld>
+    <p:spTree>
+      <p:nvGrpSpPr>
+        <p:cNvPr id="1" name=""/>
+        <p:cNvGrpSpPr/>
+        <p:nvPr/>
+      </p:nvGrpSpPr>
+      <p:grpSpPr>
+        <a:xfrm>
+          <a:off x="0" y="0"/>
+          <a:ext cx="0" cy="0"/>
+          <a:chOff x="0" y="0"/>
+          <a:chExt cx="0" cy="0"/>
+        </a:xfrm>
+      </p:grpSpPr>
+      <p:sp>
+        <p:nvSpPr>
+          <p:cNvPr id="2" name="Slide Image Placeholder 1"/>
+          <p:cNvSpPr>
+            <a:spLocks noGrp="1" noRot="1" noChangeAspect="1"/>
+          </p:cNvSpPr>
+          <p:nvPr>
+            <p:ph type="sldImg"/>
+          </p:nvPr>
+        </p:nvSpPr>
+        <p:spPr/>
+      </p:sp>
+      <p:sp>
+        <p:nvSpPr>
+          <p:cNvPr id="3" name="Notes Placeholder 2"/>
+          <p:cNvSpPr>
+            <a:spLocks noGrp="1"/>
+          </p:cNvSpPr>
+          <p:nvPr>
+            <p:ph type="body" idx="1"/>
+          </p:nvPr>
+        </p:nvSpPr>
+        <p:spPr/>
+        <p:txBody>
+          <a:bodyPr/>
+          <a:lstStyle/>
+          <a:p>
+            <a:r>
+              <a:rPr lang="en-US" sz="1200" b="0" i="0" u="none" strike="noStrike" kern="1200" dirty="0">
+                <a:solidFill>
+                  <a:schemeClr val="tx1"/>
+                </a:solidFill>
+                <a:effectLst/>
+                <a:latin typeface="+mn-lt"/>
+                <a:ea typeface="+mn-ea"/>
+                <a:cs typeface="+mn-cs"/>
+              </a:rPr>
+              <a:t>Various models were tested for the initial phase of sleep stage annotation including MLP, Convolution Neural Network, recurrent  neural network, long short term memory, and random forest. </a:t>
+            </a:r>
+            <a:endParaRPr lang="en-US" dirty="0"/>
+          </a:p>
+        </p:txBody>
+      </p:sp>
+      <p:sp>
+        <p:nvSpPr>
+          <p:cNvPr id="4" name="Slide Number Placeholder 3"/>
+          <p:cNvSpPr>
+            <a:spLocks noGrp="1"/>
+          </p:cNvSpPr>
+          <p:nvPr>
+            <p:ph type="sldNum" sz="quarter" idx="5"/>
+          </p:nvPr>
+        </p:nvSpPr>
+        <p:spPr/>
+        <p:txBody>
+          <a:bodyPr/>
+          <a:lstStyle/>
+          <a:p>
+            <a:fld id="{E49343A0-2944-4314-B438-D02261F85AA9}" type="slidenum">
+              <a:rPr lang="en-US" smtClean="0"/>
+              <a:t>37</a:t>
+            </a:fld>
+            <a:endParaRPr lang="en-US"/>
+          </a:p>
+        </p:txBody>
+      </p:sp>
+    </p:spTree>
+    <p:extLst>
+      <p:ext uri="{BB962C8B-B14F-4D97-AF65-F5344CB8AC3E}">
+        <p14:creationId xmlns:p14="http://schemas.microsoft.com/office/powerpoint/2010/main" val="2919503375"/>
+      </p:ext>
+    </p:extLst>
+  </p:cSld>
+  <p:clrMapOvr>
+    <a:masterClrMapping/>
+  </p:clrMapOvr>
+</p:notes>
+</file>
+
+<file path=ppt/notesSlides/notesSlide35.xml><?xml version="1.0" encoding="utf-8"?>
+<p:notes xmlns:a="http://schemas.openxmlformats.org/drawingml/2006/main" xmlns:r="http://schemas.openxmlformats.org/officeDocument/2006/relationships" xmlns:p="http://schemas.openxmlformats.org/presentationml/2006/main">
+  <p:cSld>
+    <p:spTree>
+      <p:nvGrpSpPr>
+        <p:cNvPr id="1" name=""/>
+        <p:cNvGrpSpPr/>
+        <p:nvPr/>
+      </p:nvGrpSpPr>
+      <p:grpSpPr>
+        <a:xfrm>
+          <a:off x="0" y="0"/>
+          <a:ext cx="0" cy="0"/>
+          <a:chOff x="0" y="0"/>
+          <a:chExt cx="0" cy="0"/>
+        </a:xfrm>
+      </p:grpSpPr>
+      <p:sp>
+        <p:nvSpPr>
+          <p:cNvPr id="2" name="Slide Image Placeholder 1"/>
+          <p:cNvSpPr>
+            <a:spLocks noGrp="1" noRot="1" noChangeAspect="1"/>
+          </p:cNvSpPr>
+          <p:nvPr>
+            <p:ph type="sldImg"/>
+          </p:nvPr>
+        </p:nvSpPr>
+        <p:spPr/>
+      </p:sp>
+      <p:sp>
+        <p:nvSpPr>
+          <p:cNvPr id="3" name="Notes Placeholder 2"/>
+          <p:cNvSpPr>
+            <a:spLocks noGrp="1"/>
+          </p:cNvSpPr>
+          <p:nvPr>
+            <p:ph type="body" idx="1"/>
+          </p:nvPr>
+        </p:nvSpPr>
+        <p:spPr/>
+        <p:txBody>
+          <a:bodyPr/>
+          <a:lstStyle/>
+          <a:p>
+            <a:r>
+              <a:rPr lang="en-US" sz="1200" b="0" i="0" u="none" strike="noStrike" kern="1200" dirty="0">
+                <a:solidFill>
+                  <a:schemeClr val="tx1"/>
+                </a:solidFill>
+                <a:effectLst/>
+                <a:latin typeface="+mn-lt"/>
+                <a:ea typeface="+mn-ea"/>
+                <a:cs typeface="+mn-cs"/>
+              </a:rPr>
+              <a:t>In the final pipeline, considering speed, overall accuracy, </a:t>
+            </a:r>
+            <a:endParaRPr lang="en-US" dirty="0"/>
+          </a:p>
+        </p:txBody>
+      </p:sp>
+      <p:sp>
+        <p:nvSpPr>
+          <p:cNvPr id="4" name="Slide Number Placeholder 3"/>
+          <p:cNvSpPr>
+            <a:spLocks noGrp="1"/>
+          </p:cNvSpPr>
+          <p:nvPr>
+            <p:ph type="sldNum" sz="quarter" idx="5"/>
+          </p:nvPr>
+        </p:nvSpPr>
+        <p:spPr/>
+        <p:txBody>
+          <a:bodyPr/>
+          <a:lstStyle/>
+          <a:p>
+            <a:fld id="{E49343A0-2944-4314-B438-D02261F85AA9}" type="slidenum">
+              <a:rPr lang="en-US" smtClean="0"/>
+              <a:t>38</a:t>
+            </a:fld>
+            <a:endParaRPr lang="en-US"/>
+          </a:p>
+        </p:txBody>
+      </p:sp>
+    </p:spTree>
+    <p:extLst>
+      <p:ext uri="{BB962C8B-B14F-4D97-AF65-F5344CB8AC3E}">
+        <p14:creationId xmlns:p14="http://schemas.microsoft.com/office/powerpoint/2010/main" val="1535967740"/>
+      </p:ext>
+    </p:extLst>
+  </p:cSld>
+  <p:clrMapOvr>
+    <a:masterClrMapping/>
+  </p:clrMapOvr>
+</p:notes>
+</file>
+
+<file path=ppt/notesSlides/notesSlide36.xml><?xml version="1.0" encoding="utf-8"?>
+<p:notes xmlns:a="http://schemas.openxmlformats.org/drawingml/2006/main" xmlns:r="http://schemas.openxmlformats.org/officeDocument/2006/relationships" xmlns:p="http://schemas.openxmlformats.org/presentationml/2006/main">
+  <p:cSld>
+    <p:spTree>
+      <p:nvGrpSpPr>
+        <p:cNvPr id="1" name=""/>
+        <p:cNvGrpSpPr/>
+        <p:nvPr/>
+      </p:nvGrpSpPr>
+      <p:grpSpPr>
+        <a:xfrm>
+          <a:off x="0" y="0"/>
+          <a:ext cx="0" cy="0"/>
+          <a:chOff x="0" y="0"/>
+          <a:chExt cx="0" cy="0"/>
+        </a:xfrm>
+      </p:grpSpPr>
+      <p:sp>
+        <p:nvSpPr>
+          <p:cNvPr id="2" name="Slide Image Placeholder 1"/>
+          <p:cNvSpPr>
+            <a:spLocks noGrp="1" noRot="1" noChangeAspect="1"/>
+          </p:cNvSpPr>
+          <p:nvPr>
+            <p:ph type="sldImg"/>
+          </p:nvPr>
+        </p:nvSpPr>
+        <p:spPr/>
+      </p:sp>
+      <p:sp>
+        <p:nvSpPr>
+          <p:cNvPr id="3" name="Notes Placeholder 2"/>
+          <p:cNvSpPr>
+            <a:spLocks noGrp="1"/>
+          </p:cNvSpPr>
+          <p:nvPr>
+            <p:ph type="body" idx="1"/>
+          </p:nvPr>
+        </p:nvSpPr>
+        <p:spPr/>
+        <p:txBody>
+          <a:bodyPr/>
+          <a:lstStyle/>
+          <a:p>
+            <a:r>
+              <a:rPr lang="en-US" sz="1200" b="0" i="0" u="none" strike="noStrike" kern="1200" dirty="0">
+                <a:solidFill>
+                  <a:schemeClr val="tx1"/>
+                </a:solidFill>
+                <a:effectLst/>
+                <a:latin typeface="+mn-lt"/>
+                <a:ea typeface="+mn-ea"/>
+                <a:cs typeface="+mn-cs"/>
+              </a:rPr>
+              <a:t>random forest model was used.</a:t>
+            </a:r>
+            <a:endParaRPr lang="en-US" dirty="0"/>
+          </a:p>
+        </p:txBody>
+      </p:sp>
+      <p:sp>
+        <p:nvSpPr>
+          <p:cNvPr id="4" name="Slide Number Placeholder 3"/>
+          <p:cNvSpPr>
+            <a:spLocks noGrp="1"/>
+          </p:cNvSpPr>
+          <p:nvPr>
+            <p:ph type="sldNum" sz="quarter" idx="5"/>
+          </p:nvPr>
+        </p:nvSpPr>
+        <p:spPr/>
+        <p:txBody>
+          <a:bodyPr/>
+          <a:lstStyle/>
+          <a:p>
+            <a:fld id="{E49343A0-2944-4314-B438-D02261F85AA9}" type="slidenum">
+              <a:rPr lang="en-US" smtClean="0"/>
+              <a:t>39</a:t>
+            </a:fld>
+            <a:endParaRPr lang="en-US"/>
+          </a:p>
+        </p:txBody>
+      </p:sp>
+    </p:spTree>
+    <p:extLst>
+      <p:ext uri="{BB962C8B-B14F-4D97-AF65-F5344CB8AC3E}">
+        <p14:creationId xmlns:p14="http://schemas.microsoft.com/office/powerpoint/2010/main" val="1921989108"/>
+      </p:ext>
+    </p:extLst>
+  </p:cSld>
+  <p:clrMapOvr>
+    <a:masterClrMapping/>
+  </p:clrMapOvr>
+</p:notes>
+</file>
+
+<file path=ppt/notesSlides/notesSlide37.xml><?xml version="1.0" encoding="utf-8"?>
+<p:notes xmlns:a="http://schemas.openxmlformats.org/drawingml/2006/main" xmlns:r="http://schemas.openxmlformats.org/officeDocument/2006/relationships" xmlns:p="http://schemas.openxmlformats.org/presentationml/2006/main">
+  <p:cSld>
+    <p:spTree>
+      <p:nvGrpSpPr>
+        <p:cNvPr id="1" name=""/>
+        <p:cNvGrpSpPr/>
+        <p:nvPr/>
+      </p:nvGrpSpPr>
+      <p:grpSpPr>
+        <a:xfrm>
+          <a:off x="0" y="0"/>
+          <a:ext cx="0" cy="0"/>
+          <a:chOff x="0" y="0"/>
+          <a:chExt cx="0" cy="0"/>
+        </a:xfrm>
+      </p:grpSpPr>
+      <p:sp>
+        <p:nvSpPr>
+          <p:cNvPr id="2" name="Slide Image Placeholder 1"/>
+          <p:cNvSpPr>
+            <a:spLocks noGrp="1" noRot="1" noChangeAspect="1"/>
+          </p:cNvSpPr>
+          <p:nvPr>
+            <p:ph type="sldImg"/>
+          </p:nvPr>
+        </p:nvSpPr>
+        <p:spPr/>
+      </p:sp>
+      <p:sp>
+        <p:nvSpPr>
+          <p:cNvPr id="3" name="Notes Placeholder 2"/>
+          <p:cNvSpPr>
+            <a:spLocks noGrp="1"/>
+          </p:cNvSpPr>
+          <p:nvPr>
+            <p:ph type="body" idx="1"/>
+          </p:nvPr>
+        </p:nvSpPr>
+        <p:spPr/>
+        <p:txBody>
+          <a:bodyPr/>
+          <a:lstStyle/>
+          <a:p>
+            <a:r>
+              <a:rPr lang="en-US" sz="1200" b="0" i="0" u="none" strike="noStrike" kern="1200" dirty="0">
+                <a:solidFill>
+                  <a:schemeClr val="tx1"/>
+                </a:solidFill>
+                <a:effectLst/>
+                <a:latin typeface="+mn-lt"/>
+                <a:ea typeface="+mn-ea"/>
+                <a:cs typeface="+mn-cs"/>
+              </a:rPr>
+              <a:t>in the future, if further testing on CNN-CNN using PSD can result in accuracy over 80%</a:t>
+            </a:r>
+            <a:endParaRPr lang="en-US" dirty="0"/>
+          </a:p>
+        </p:txBody>
+      </p:sp>
+      <p:sp>
+        <p:nvSpPr>
+          <p:cNvPr id="4" name="Slide Number Placeholder 3"/>
+          <p:cNvSpPr>
+            <a:spLocks noGrp="1"/>
+          </p:cNvSpPr>
+          <p:nvPr>
+            <p:ph type="sldNum" sz="quarter" idx="5"/>
+          </p:nvPr>
+        </p:nvSpPr>
+        <p:spPr/>
+        <p:txBody>
+          <a:bodyPr/>
+          <a:lstStyle/>
+          <a:p>
+            <a:fld id="{E49343A0-2944-4314-B438-D02261F85AA9}" type="slidenum">
+              <a:rPr lang="en-US" smtClean="0"/>
+              <a:t>40</a:t>
+            </a:fld>
+            <a:endParaRPr lang="en-US"/>
+          </a:p>
+        </p:txBody>
+      </p:sp>
+    </p:spTree>
+    <p:extLst>
+      <p:ext uri="{BB962C8B-B14F-4D97-AF65-F5344CB8AC3E}">
+        <p14:creationId xmlns:p14="http://schemas.microsoft.com/office/powerpoint/2010/main" val="1594165688"/>
+      </p:ext>
+    </p:extLst>
+  </p:cSld>
+  <p:clrMapOvr>
+    <a:masterClrMapping/>
+  </p:clrMapOvr>
+</p:notes>
+</file>
+
+<file path=ppt/notesSlides/notesSlide38.xml><?xml version="1.0" encoding="utf-8"?>
+<p:notes xmlns:a="http://schemas.openxmlformats.org/drawingml/2006/main" xmlns:r="http://schemas.openxmlformats.org/officeDocument/2006/relationships" xmlns:p="http://schemas.openxmlformats.org/presentationml/2006/main">
+  <p:cSld>
+    <p:spTree>
+      <p:nvGrpSpPr>
+        <p:cNvPr id="1" name=""/>
+        <p:cNvGrpSpPr/>
+        <p:nvPr/>
+      </p:nvGrpSpPr>
+      <p:grpSpPr>
+        <a:xfrm>
+          <a:off x="0" y="0"/>
+          <a:ext cx="0" cy="0"/>
+          <a:chOff x="0" y="0"/>
+          <a:chExt cx="0" cy="0"/>
+        </a:xfrm>
+      </p:grpSpPr>
+      <p:sp>
+        <p:nvSpPr>
+          <p:cNvPr id="2" name="Slide Image Placeholder 1"/>
+          <p:cNvSpPr>
+            <a:spLocks noGrp="1" noRot="1" noChangeAspect="1"/>
+          </p:cNvSpPr>
+          <p:nvPr>
+            <p:ph type="sldImg"/>
+          </p:nvPr>
+        </p:nvSpPr>
+        <p:spPr/>
+      </p:sp>
+      <p:sp>
+        <p:nvSpPr>
+          <p:cNvPr id="3" name="Notes Placeholder 2"/>
+          <p:cNvSpPr>
+            <a:spLocks noGrp="1"/>
+          </p:cNvSpPr>
+          <p:nvPr>
+            <p:ph type="body" idx="1"/>
+          </p:nvPr>
+        </p:nvSpPr>
+        <p:spPr/>
+        <p:txBody>
+          <a:bodyPr/>
+          <a:lstStyle/>
+          <a:p>
+            <a:r>
+              <a:rPr lang="en-US" sz="1200" b="0" i="0" u="none" strike="noStrike" kern="1200" dirty="0">
+                <a:solidFill>
+                  <a:schemeClr val="tx1"/>
+                </a:solidFill>
+                <a:effectLst/>
+                <a:latin typeface="+mn-lt"/>
+                <a:ea typeface="+mn-ea"/>
+                <a:cs typeface="+mn-cs"/>
+              </a:rPr>
+              <a:t>With this research, we demonstrated a pipeline </a:t>
+            </a:r>
+            <a:endParaRPr lang="en-US" dirty="0"/>
+          </a:p>
+        </p:txBody>
+      </p:sp>
+      <p:sp>
+        <p:nvSpPr>
+          <p:cNvPr id="4" name="Slide Number Placeholder 3"/>
+          <p:cNvSpPr>
+            <a:spLocks noGrp="1"/>
+          </p:cNvSpPr>
+          <p:nvPr>
+            <p:ph type="sldNum" sz="quarter" idx="5"/>
+          </p:nvPr>
+        </p:nvSpPr>
+        <p:spPr/>
+        <p:txBody>
+          <a:bodyPr/>
+          <a:lstStyle/>
+          <a:p>
+            <a:fld id="{E49343A0-2944-4314-B438-D02261F85AA9}" type="slidenum">
+              <a:rPr lang="en-US" smtClean="0"/>
+              <a:t>41</a:t>
+            </a:fld>
+            <a:endParaRPr lang="en-US"/>
+          </a:p>
+        </p:txBody>
+      </p:sp>
+    </p:spTree>
+    <p:extLst>
+      <p:ext uri="{BB962C8B-B14F-4D97-AF65-F5344CB8AC3E}">
+        <p14:creationId xmlns:p14="http://schemas.microsoft.com/office/powerpoint/2010/main" val="3835719114"/>
+      </p:ext>
+    </p:extLst>
+  </p:cSld>
+  <p:clrMapOvr>
+    <a:masterClrMapping/>
+  </p:clrMapOvr>
+</p:notes>
+</file>
+
+<file path=ppt/notesSlides/notesSlide39.xml><?xml version="1.0" encoding="utf-8"?>
+<p:notes xmlns:a="http://schemas.openxmlformats.org/drawingml/2006/main" xmlns:r="http://schemas.openxmlformats.org/officeDocument/2006/relationships" xmlns:p="http://schemas.openxmlformats.org/presentationml/2006/main">
+  <p:cSld>
+    <p:spTree>
+      <p:nvGrpSpPr>
+        <p:cNvPr id="1" name=""/>
+        <p:cNvGrpSpPr/>
+        <p:nvPr/>
+      </p:nvGrpSpPr>
+      <p:grpSpPr>
+        <a:xfrm>
+          <a:off x="0" y="0"/>
+          <a:ext cx="0" cy="0"/>
+          <a:chOff x="0" y="0"/>
+          <a:chExt cx="0" cy="0"/>
+        </a:xfrm>
+      </p:grpSpPr>
+      <p:sp>
+        <p:nvSpPr>
+          <p:cNvPr id="2" name="Slide Image Placeholder 1"/>
+          <p:cNvSpPr>
+            <a:spLocks noGrp="1" noRot="1" noChangeAspect="1"/>
+          </p:cNvSpPr>
+          <p:nvPr>
+            <p:ph type="sldImg"/>
+          </p:nvPr>
+        </p:nvSpPr>
+        <p:spPr/>
+      </p:sp>
+      <p:sp>
+        <p:nvSpPr>
+          <p:cNvPr id="3" name="Notes Placeholder 2"/>
+          <p:cNvSpPr>
+            <a:spLocks noGrp="1"/>
+          </p:cNvSpPr>
+          <p:nvPr>
+            <p:ph type="body" idx="1"/>
+          </p:nvPr>
+        </p:nvSpPr>
+        <p:spPr/>
+        <p:txBody>
+          <a:bodyPr/>
+          <a:lstStyle/>
+          <a:p>
+            <a:r>
+              <a:rPr lang="en-US" sz="1200" b="0" i="0" u="none" strike="noStrike" kern="1200" dirty="0">
+                <a:solidFill>
+                  <a:schemeClr val="tx1"/>
+                </a:solidFill>
+                <a:effectLst/>
+                <a:latin typeface="+mn-lt"/>
+                <a:ea typeface="+mn-ea"/>
+                <a:cs typeface="+mn-cs"/>
+              </a:rPr>
+              <a:t>to predict a new patient’s sleep stages </a:t>
+            </a:r>
+            <a:endParaRPr lang="en-US" dirty="0"/>
+          </a:p>
+        </p:txBody>
+      </p:sp>
+      <p:sp>
+        <p:nvSpPr>
+          <p:cNvPr id="4" name="Slide Number Placeholder 3"/>
+          <p:cNvSpPr>
+            <a:spLocks noGrp="1"/>
+          </p:cNvSpPr>
+          <p:nvPr>
+            <p:ph type="sldNum" sz="quarter" idx="5"/>
+          </p:nvPr>
+        </p:nvSpPr>
+        <p:spPr/>
+        <p:txBody>
+          <a:bodyPr/>
+          <a:lstStyle/>
+          <a:p>
+            <a:fld id="{E49343A0-2944-4314-B438-D02261F85AA9}" type="slidenum">
+              <a:rPr lang="en-US" smtClean="0"/>
+              <a:t>42</a:t>
+            </a:fld>
+            <a:endParaRPr lang="en-US"/>
+          </a:p>
+        </p:txBody>
+      </p:sp>
+    </p:spTree>
+    <p:extLst>
+      <p:ext uri="{BB962C8B-B14F-4D97-AF65-F5344CB8AC3E}">
+        <p14:creationId xmlns:p14="http://schemas.microsoft.com/office/powerpoint/2010/main" val="901931497"/>
+      </p:ext>
+    </p:extLst>
+  </p:cSld>
+  <p:clrMapOvr>
+    <a:masterClrMapping/>
+  </p:clrMapOvr>
+</p:notes>
+</file>
+
 <file path=ppt/notesSlides/notesSlide4.xml><?xml version="1.0" encoding="utf-8"?>
 <p:notes xmlns:a="http://schemas.openxmlformats.org/drawingml/2006/main" xmlns:r="http://schemas.openxmlformats.org/officeDocument/2006/relationships" xmlns:p="http://schemas.openxmlformats.org/presentationml/2006/main">
   <p:cSld>
@@ -3462,6 +4047,486 @@
     <p:extLst>
       <p:ext uri="{BB962C8B-B14F-4D97-AF65-F5344CB8AC3E}">
         <p14:creationId xmlns:p14="http://schemas.microsoft.com/office/powerpoint/2010/main" val="675880001"/>
+      </p:ext>
+    </p:extLst>
+  </p:cSld>
+  <p:clrMapOvr>
+    <a:masterClrMapping/>
+  </p:clrMapOvr>
+</p:notes>
+</file>
+
+<file path=ppt/notesSlides/notesSlide40.xml><?xml version="1.0" encoding="utf-8"?>
+<p:notes xmlns:a="http://schemas.openxmlformats.org/drawingml/2006/main" xmlns:r="http://schemas.openxmlformats.org/officeDocument/2006/relationships" xmlns:p="http://schemas.openxmlformats.org/presentationml/2006/main">
+  <p:cSld>
+    <p:spTree>
+      <p:nvGrpSpPr>
+        <p:cNvPr id="1" name=""/>
+        <p:cNvGrpSpPr/>
+        <p:nvPr/>
+      </p:nvGrpSpPr>
+      <p:grpSpPr>
+        <a:xfrm>
+          <a:off x="0" y="0"/>
+          <a:ext cx="0" cy="0"/>
+          <a:chOff x="0" y="0"/>
+          <a:chExt cx="0" cy="0"/>
+        </a:xfrm>
+      </p:grpSpPr>
+      <p:sp>
+        <p:nvSpPr>
+          <p:cNvPr id="2" name="Slide Image Placeholder 1"/>
+          <p:cNvSpPr>
+            <a:spLocks noGrp="1" noRot="1" noChangeAspect="1"/>
+          </p:cNvSpPr>
+          <p:nvPr>
+            <p:ph type="sldImg"/>
+          </p:nvPr>
+        </p:nvSpPr>
+        <p:spPr/>
+      </p:sp>
+      <p:sp>
+        <p:nvSpPr>
+          <p:cNvPr id="3" name="Notes Placeholder 2"/>
+          <p:cNvSpPr>
+            <a:spLocks noGrp="1"/>
+          </p:cNvSpPr>
+          <p:nvPr>
+            <p:ph type="body" idx="1"/>
+          </p:nvPr>
+        </p:nvSpPr>
+        <p:spPr/>
+        <p:txBody>
+          <a:bodyPr/>
+          <a:lstStyle/>
+          <a:p>
+            <a:r>
+              <a:rPr lang="en-US" sz="1200" b="0" i="0" u="none" strike="noStrike" kern="1200" dirty="0">
+                <a:solidFill>
+                  <a:schemeClr val="tx1"/>
+                </a:solidFill>
+                <a:effectLst/>
+                <a:latin typeface="+mn-lt"/>
+                <a:ea typeface="+mn-ea"/>
+                <a:cs typeface="+mn-cs"/>
+              </a:rPr>
+              <a:t>using raw EEG readings</a:t>
+            </a:r>
+            <a:endParaRPr lang="en-US" dirty="0"/>
+          </a:p>
+        </p:txBody>
+      </p:sp>
+      <p:sp>
+        <p:nvSpPr>
+          <p:cNvPr id="4" name="Slide Number Placeholder 3"/>
+          <p:cNvSpPr>
+            <a:spLocks noGrp="1"/>
+          </p:cNvSpPr>
+          <p:nvPr>
+            <p:ph type="sldNum" sz="quarter" idx="5"/>
+          </p:nvPr>
+        </p:nvSpPr>
+        <p:spPr/>
+        <p:txBody>
+          <a:bodyPr/>
+          <a:lstStyle/>
+          <a:p>
+            <a:fld id="{E49343A0-2944-4314-B438-D02261F85AA9}" type="slidenum">
+              <a:rPr lang="en-US" smtClean="0"/>
+              <a:t>43</a:t>
+            </a:fld>
+            <a:endParaRPr lang="en-US"/>
+          </a:p>
+        </p:txBody>
+      </p:sp>
+    </p:spTree>
+    <p:extLst>
+      <p:ext uri="{BB962C8B-B14F-4D97-AF65-F5344CB8AC3E}">
+        <p14:creationId xmlns:p14="http://schemas.microsoft.com/office/powerpoint/2010/main" val="598413203"/>
+      </p:ext>
+    </p:extLst>
+  </p:cSld>
+  <p:clrMapOvr>
+    <a:masterClrMapping/>
+  </p:clrMapOvr>
+</p:notes>
+</file>
+
+<file path=ppt/notesSlides/notesSlide41.xml><?xml version="1.0" encoding="utf-8"?>
+<p:notes xmlns:a="http://schemas.openxmlformats.org/drawingml/2006/main" xmlns:r="http://schemas.openxmlformats.org/officeDocument/2006/relationships" xmlns:p="http://schemas.openxmlformats.org/presentationml/2006/main">
+  <p:cSld>
+    <p:spTree>
+      <p:nvGrpSpPr>
+        <p:cNvPr id="1" name=""/>
+        <p:cNvGrpSpPr/>
+        <p:nvPr/>
+      </p:nvGrpSpPr>
+      <p:grpSpPr>
+        <a:xfrm>
+          <a:off x="0" y="0"/>
+          <a:ext cx="0" cy="0"/>
+          <a:chOff x="0" y="0"/>
+          <a:chExt cx="0" cy="0"/>
+        </a:xfrm>
+      </p:grpSpPr>
+      <p:sp>
+        <p:nvSpPr>
+          <p:cNvPr id="2" name="Slide Image Placeholder 1"/>
+          <p:cNvSpPr>
+            <a:spLocks noGrp="1" noRot="1" noChangeAspect="1"/>
+          </p:cNvSpPr>
+          <p:nvPr>
+            <p:ph type="sldImg"/>
+          </p:nvPr>
+        </p:nvSpPr>
+        <p:spPr/>
+      </p:sp>
+      <p:sp>
+        <p:nvSpPr>
+          <p:cNvPr id="3" name="Notes Placeholder 2"/>
+          <p:cNvSpPr>
+            <a:spLocks noGrp="1"/>
+          </p:cNvSpPr>
+          <p:nvPr>
+            <p:ph type="body" idx="1"/>
+          </p:nvPr>
+        </p:nvSpPr>
+        <p:spPr/>
+        <p:txBody>
+          <a:bodyPr/>
+          <a:lstStyle/>
+          <a:p>
+            <a:r>
+              <a:rPr lang="en-US" sz="1200" b="0" i="0" u="none" strike="noStrike" kern="1200" dirty="0">
+                <a:solidFill>
+                  <a:schemeClr val="tx1"/>
+                </a:solidFill>
+                <a:effectLst/>
+                <a:latin typeface="+mn-lt"/>
+                <a:ea typeface="+mn-ea"/>
+                <a:cs typeface="+mn-cs"/>
+              </a:rPr>
+              <a:t>and compare them with pre-trained subject clusters </a:t>
+            </a:r>
+            <a:endParaRPr lang="en-US" dirty="0"/>
+          </a:p>
+        </p:txBody>
+      </p:sp>
+      <p:sp>
+        <p:nvSpPr>
+          <p:cNvPr id="4" name="Slide Number Placeholder 3"/>
+          <p:cNvSpPr>
+            <a:spLocks noGrp="1"/>
+          </p:cNvSpPr>
+          <p:nvPr>
+            <p:ph type="sldNum" sz="quarter" idx="5"/>
+          </p:nvPr>
+        </p:nvSpPr>
+        <p:spPr/>
+        <p:txBody>
+          <a:bodyPr/>
+          <a:lstStyle/>
+          <a:p>
+            <a:fld id="{E49343A0-2944-4314-B438-D02261F85AA9}" type="slidenum">
+              <a:rPr lang="en-US" smtClean="0"/>
+              <a:t>44</a:t>
+            </a:fld>
+            <a:endParaRPr lang="en-US"/>
+          </a:p>
+        </p:txBody>
+      </p:sp>
+    </p:spTree>
+    <p:extLst>
+      <p:ext uri="{BB962C8B-B14F-4D97-AF65-F5344CB8AC3E}">
+        <p14:creationId xmlns:p14="http://schemas.microsoft.com/office/powerpoint/2010/main" val="3616680758"/>
+      </p:ext>
+    </p:extLst>
+  </p:cSld>
+  <p:clrMapOvr>
+    <a:masterClrMapping/>
+  </p:clrMapOvr>
+</p:notes>
+</file>
+
+<file path=ppt/notesSlides/notesSlide42.xml><?xml version="1.0" encoding="utf-8"?>
+<p:notes xmlns:a="http://schemas.openxmlformats.org/drawingml/2006/main" xmlns:r="http://schemas.openxmlformats.org/officeDocument/2006/relationships" xmlns:p="http://schemas.openxmlformats.org/presentationml/2006/main">
+  <p:cSld>
+    <p:spTree>
+      <p:nvGrpSpPr>
+        <p:cNvPr id="1" name=""/>
+        <p:cNvGrpSpPr/>
+        <p:nvPr/>
+      </p:nvGrpSpPr>
+      <p:grpSpPr>
+        <a:xfrm>
+          <a:off x="0" y="0"/>
+          <a:ext cx="0" cy="0"/>
+          <a:chOff x="0" y="0"/>
+          <a:chExt cx="0" cy="0"/>
+        </a:xfrm>
+      </p:grpSpPr>
+      <p:sp>
+        <p:nvSpPr>
+          <p:cNvPr id="2" name="Slide Image Placeholder 1"/>
+          <p:cNvSpPr>
+            <a:spLocks noGrp="1" noRot="1" noChangeAspect="1"/>
+          </p:cNvSpPr>
+          <p:nvPr>
+            <p:ph type="sldImg"/>
+          </p:nvPr>
+        </p:nvSpPr>
+        <p:spPr/>
+      </p:sp>
+      <p:sp>
+        <p:nvSpPr>
+          <p:cNvPr id="3" name="Notes Placeholder 2"/>
+          <p:cNvSpPr>
+            <a:spLocks noGrp="1"/>
+          </p:cNvSpPr>
+          <p:nvPr>
+            <p:ph type="body" idx="1"/>
+          </p:nvPr>
+        </p:nvSpPr>
+        <p:spPr/>
+        <p:txBody>
+          <a:bodyPr/>
+          <a:lstStyle/>
+          <a:p>
+            <a:pPr rtl="0"/>
+            <a:r>
+              <a:rPr lang="en-US" sz="1200" b="0" i="0" u="none" strike="noStrike" kern="1200" dirty="0">
+                <a:solidFill>
+                  <a:schemeClr val="tx1"/>
+                </a:solidFill>
+                <a:effectLst/>
+                <a:latin typeface="+mn-lt"/>
+                <a:ea typeface="+mn-ea"/>
+                <a:cs typeface="+mn-cs"/>
+              </a:rPr>
+              <a:t>to predict risk probabilities for cardiovascular diseases. </a:t>
+            </a:r>
+            <a:endParaRPr lang="en-US" b="0" dirty="0">
+              <a:effectLst/>
+            </a:endParaRPr>
+          </a:p>
+          <a:p>
+            <a:br>
+              <a:rPr lang="en-US" dirty="0"/>
+            </a:br>
+            <a:endParaRPr lang="en-US" dirty="0"/>
+          </a:p>
+        </p:txBody>
+      </p:sp>
+      <p:sp>
+        <p:nvSpPr>
+          <p:cNvPr id="4" name="Slide Number Placeholder 3"/>
+          <p:cNvSpPr>
+            <a:spLocks noGrp="1"/>
+          </p:cNvSpPr>
+          <p:nvPr>
+            <p:ph type="sldNum" sz="quarter" idx="5"/>
+          </p:nvPr>
+        </p:nvSpPr>
+        <p:spPr/>
+        <p:txBody>
+          <a:bodyPr/>
+          <a:lstStyle/>
+          <a:p>
+            <a:fld id="{E49343A0-2944-4314-B438-D02261F85AA9}" type="slidenum">
+              <a:rPr lang="en-US" smtClean="0"/>
+              <a:t>45</a:t>
+            </a:fld>
+            <a:endParaRPr lang="en-US"/>
+          </a:p>
+        </p:txBody>
+      </p:sp>
+    </p:spTree>
+    <p:extLst>
+      <p:ext uri="{BB962C8B-B14F-4D97-AF65-F5344CB8AC3E}">
+        <p14:creationId xmlns:p14="http://schemas.microsoft.com/office/powerpoint/2010/main" val="1627743675"/>
+      </p:ext>
+    </p:extLst>
+  </p:cSld>
+  <p:clrMapOvr>
+    <a:masterClrMapping/>
+  </p:clrMapOvr>
+</p:notes>
+</file>
+
+<file path=ppt/notesSlides/notesSlide43.xml><?xml version="1.0" encoding="utf-8"?>
+<p:notes xmlns:a="http://schemas.openxmlformats.org/drawingml/2006/main" xmlns:r="http://schemas.openxmlformats.org/officeDocument/2006/relationships" xmlns:p="http://schemas.openxmlformats.org/presentationml/2006/main">
+  <p:cSld>
+    <p:spTree>
+      <p:nvGrpSpPr>
+        <p:cNvPr id="1" name=""/>
+        <p:cNvGrpSpPr/>
+        <p:nvPr/>
+      </p:nvGrpSpPr>
+      <p:grpSpPr>
+        <a:xfrm>
+          <a:off x="0" y="0"/>
+          <a:ext cx="0" cy="0"/>
+          <a:chOff x="0" y="0"/>
+          <a:chExt cx="0" cy="0"/>
+        </a:xfrm>
+      </p:grpSpPr>
+      <p:sp>
+        <p:nvSpPr>
+          <p:cNvPr id="2" name="Slide Image Placeholder 1"/>
+          <p:cNvSpPr>
+            <a:spLocks noGrp="1" noRot="1" noChangeAspect="1"/>
+          </p:cNvSpPr>
+          <p:nvPr>
+            <p:ph type="sldImg"/>
+          </p:nvPr>
+        </p:nvSpPr>
+        <p:spPr/>
+      </p:sp>
+      <p:sp>
+        <p:nvSpPr>
+          <p:cNvPr id="3" name="Notes Placeholder 2"/>
+          <p:cNvSpPr>
+            <a:spLocks noGrp="1"/>
+          </p:cNvSpPr>
+          <p:nvPr>
+            <p:ph type="body" idx="1"/>
+          </p:nvPr>
+        </p:nvSpPr>
+        <p:spPr/>
+        <p:txBody>
+          <a:bodyPr/>
+          <a:lstStyle/>
+          <a:p>
+            <a:r>
+              <a:rPr lang="en-US" sz="1200" b="0" i="0" u="none" strike="noStrike" kern="1200" dirty="0">
+                <a:solidFill>
+                  <a:schemeClr val="tx1"/>
+                </a:solidFill>
+                <a:effectLst/>
+                <a:latin typeface="+mn-lt"/>
+                <a:ea typeface="+mn-ea"/>
+                <a:cs typeface="+mn-cs"/>
+              </a:rPr>
+              <a:t>The pipeline provides a quick and effective way to monitor and assess a subject’s CVD risk, without knowing medical history, medication or demographics.</a:t>
+            </a:r>
+            <a:endParaRPr lang="en-US" dirty="0"/>
+          </a:p>
+        </p:txBody>
+      </p:sp>
+      <p:sp>
+        <p:nvSpPr>
+          <p:cNvPr id="4" name="Slide Number Placeholder 3"/>
+          <p:cNvSpPr>
+            <a:spLocks noGrp="1"/>
+          </p:cNvSpPr>
+          <p:nvPr>
+            <p:ph type="sldNum" sz="quarter" idx="5"/>
+          </p:nvPr>
+        </p:nvSpPr>
+        <p:spPr/>
+        <p:txBody>
+          <a:bodyPr/>
+          <a:lstStyle/>
+          <a:p>
+            <a:fld id="{E49343A0-2944-4314-B438-D02261F85AA9}" type="slidenum">
+              <a:rPr lang="en-US" smtClean="0"/>
+              <a:t>46</a:t>
+            </a:fld>
+            <a:endParaRPr lang="en-US"/>
+          </a:p>
+        </p:txBody>
+      </p:sp>
+    </p:spTree>
+    <p:extLst>
+      <p:ext uri="{BB962C8B-B14F-4D97-AF65-F5344CB8AC3E}">
+        <p14:creationId xmlns:p14="http://schemas.microsoft.com/office/powerpoint/2010/main" val="2920077244"/>
+      </p:ext>
+    </p:extLst>
+  </p:cSld>
+  <p:clrMapOvr>
+    <a:masterClrMapping/>
+  </p:clrMapOvr>
+</p:notes>
+</file>
+
+<file path=ppt/notesSlides/notesSlide44.xml><?xml version="1.0" encoding="utf-8"?>
+<p:notes xmlns:a="http://schemas.openxmlformats.org/drawingml/2006/main" xmlns:r="http://schemas.openxmlformats.org/officeDocument/2006/relationships" xmlns:p="http://schemas.openxmlformats.org/presentationml/2006/main">
+  <p:cSld>
+    <p:spTree>
+      <p:nvGrpSpPr>
+        <p:cNvPr id="1" name=""/>
+        <p:cNvGrpSpPr/>
+        <p:nvPr/>
+      </p:nvGrpSpPr>
+      <p:grpSpPr>
+        <a:xfrm>
+          <a:off x="0" y="0"/>
+          <a:ext cx="0" cy="0"/>
+          <a:chOff x="0" y="0"/>
+          <a:chExt cx="0" cy="0"/>
+        </a:xfrm>
+      </p:grpSpPr>
+      <p:sp>
+        <p:nvSpPr>
+          <p:cNvPr id="2" name="Slide Image Placeholder 1"/>
+          <p:cNvSpPr>
+            <a:spLocks noGrp="1" noRot="1" noChangeAspect="1"/>
+          </p:cNvSpPr>
+          <p:nvPr>
+            <p:ph type="sldImg"/>
+          </p:nvPr>
+        </p:nvSpPr>
+        <p:spPr/>
+      </p:sp>
+      <p:sp>
+        <p:nvSpPr>
+          <p:cNvPr id="3" name="Notes Placeholder 2"/>
+          <p:cNvSpPr>
+            <a:spLocks noGrp="1"/>
+          </p:cNvSpPr>
+          <p:nvPr>
+            <p:ph type="body" idx="1"/>
+          </p:nvPr>
+        </p:nvSpPr>
+        <p:spPr/>
+        <p:txBody>
+          <a:bodyPr/>
+          <a:lstStyle/>
+          <a:p>
+            <a:r>
+              <a:rPr lang="en-US"/>
+              <a:t>Thank you!</a:t>
+            </a:r>
+          </a:p>
+        </p:txBody>
+      </p:sp>
+      <p:sp>
+        <p:nvSpPr>
+          <p:cNvPr id="4" name="Slide Number Placeholder 3"/>
+          <p:cNvSpPr>
+            <a:spLocks noGrp="1"/>
+          </p:cNvSpPr>
+          <p:nvPr>
+            <p:ph type="sldNum" sz="quarter" idx="5"/>
+          </p:nvPr>
+        </p:nvSpPr>
+        <p:spPr/>
+        <p:txBody>
+          <a:bodyPr/>
+          <a:lstStyle/>
+          <a:p>
+            <a:fld id="{E49343A0-2944-4314-B438-D02261F85AA9}" type="slidenum">
+              <a:rPr lang="en-US" smtClean="0"/>
+              <a:t>47</a:t>
+            </a:fld>
+            <a:endParaRPr lang="en-US"/>
+          </a:p>
+        </p:txBody>
+      </p:sp>
+    </p:spTree>
+    <p:extLst>
+      <p:ext uri="{BB962C8B-B14F-4D97-AF65-F5344CB8AC3E}">
+        <p14:creationId xmlns:p14="http://schemas.microsoft.com/office/powerpoint/2010/main" val="4169327243"/>
       </p:ext>
     </p:extLst>
   </p:cSld>
@@ -10096,7 +11161,7 @@
           <p:nvPr/>
         </p:nvPicPr>
         <p:blipFill>
-          <a:blip r:embed="rId2">
+          <a:blip r:embed="rId3">
             <a:extLst>
               <a:ext uri="{28A0092B-C50C-407E-A947-70E740481C1C}">
                 <a14:useLocalDpi xmlns:a14="http://schemas.microsoft.com/office/drawing/2010/main" val="0"/>
@@ -10111,6 +11176,80 @@
           <a:xfrm>
             <a:off x="245075" y="0"/>
             <a:ext cx="1303638" cy="1303638"/>
+          </a:xfrm>
+          <a:prstGeom prst="rect">
+            <a:avLst/>
+          </a:prstGeom>
+        </p:spPr>
+      </p:pic>
+      <p:sp>
+        <p:nvSpPr>
+          <p:cNvPr id="2" name="Rectangle 1">
+            <a:extLst>
+              <a:ext uri="{FF2B5EF4-FFF2-40B4-BE49-F238E27FC236}">
+                <a16:creationId xmlns:a16="http://schemas.microsoft.com/office/drawing/2014/main" id="{5C5893E5-6817-4BC0-A4EA-D39C8962190F}"/>
+              </a:ext>
+            </a:extLst>
+          </p:cNvPr>
+          <p:cNvSpPr/>
+          <p:nvPr/>
+        </p:nvSpPr>
+        <p:spPr>
+          <a:xfrm>
+            <a:off x="3827731" y="5665041"/>
+            <a:ext cx="5522281" cy="584775"/>
+          </a:xfrm>
+          <a:prstGeom prst="rect">
+            <a:avLst/>
+          </a:prstGeom>
+        </p:spPr>
+        <p:txBody>
+          <a:bodyPr wrap="none">
+            <a:spAutoFit/>
+          </a:bodyPr>
+          <a:lstStyle/>
+          <a:p>
+            <a:r>
+              <a:rPr lang="en-US" sz="3200" dirty="0">
+                <a:solidFill>
+                  <a:srgbClr val="167AC6"/>
+                </a:solidFill>
+                <a:latin typeface="YouTube Noto"/>
+                <a:hlinkClick r:id="rId4"/>
+              </a:rPr>
+              <a:t>https://youtu.be/EDbqoY_38Go</a:t>
+            </a:r>
+            <a:endParaRPr lang="en-US" sz="3200" dirty="0"/>
+          </a:p>
+        </p:txBody>
+      </p:sp>
+      <p:pic>
+        <p:nvPicPr>
+          <p:cNvPr id="7" name="Online Media 6" title="Big Data Health CSE-6250-O01 Team 11 Final">
+            <a:hlinkClick r:id="" action="ppaction://media"/>
+            <a:extLst>
+              <a:ext uri="{FF2B5EF4-FFF2-40B4-BE49-F238E27FC236}">
+                <a16:creationId xmlns:a16="http://schemas.microsoft.com/office/drawing/2014/main" id="{86EA4D1E-6498-46DD-BA3B-E0DF7421E85C}"/>
+              </a:ext>
+            </a:extLst>
+          </p:cNvPr>
+          <p:cNvPicPr>
+            <a:picLocks noRot="1" noChangeAspect="1"/>
+          </p:cNvPicPr>
+          <p:nvPr>
+            <a:videoFile r:link="rId1"/>
+          </p:nvPr>
+        </p:nvPicPr>
+        <p:blipFill>
+          <a:blip r:embed="rId5"/>
+          <a:stretch>
+            <a:fillRect/>
+          </a:stretch>
+        </p:blipFill>
+        <p:spPr>
+          <a:xfrm>
+            <a:off x="2520483" y="932593"/>
+            <a:ext cx="8136775" cy="4576936"/>
           </a:xfrm>
           <a:prstGeom prst="rect">
             <a:avLst/>
@@ -12412,7 +13551,7 @@
         </p:nvSpPr>
         <p:spPr>
           <a:xfrm>
-            <a:off x="2241832" y="271119"/>
+            <a:off x="2529699" y="2931319"/>
             <a:ext cx="7550590" cy="1655762"/>
           </a:xfrm>
           <a:prstGeom prst="rect">
@@ -14549,7 +15688,7 @@
           <p:nvPr/>
         </p:nvPicPr>
         <p:blipFill>
-          <a:blip r:embed="rId2">
+          <a:blip r:embed="rId3">
             <a:extLst>
               <a:ext uri="{28A0092B-C50C-407E-A947-70E740481C1C}">
                 <a14:useLocalDpi xmlns:a14="http://schemas.microsoft.com/office/drawing/2010/main" val="0"/>
@@ -14570,10 +15709,46 @@
           </a:prstGeom>
         </p:spPr>
       </p:pic>
+      <p:pic>
+        <p:nvPicPr>
+          <p:cNvPr id="5" name="Picture 4" descr="A screenshot of a cell phone&#10;&#10;Description automatically generated">
+            <a:extLst>
+              <a:ext uri="{FF2B5EF4-FFF2-40B4-BE49-F238E27FC236}">
+                <a16:creationId xmlns:a16="http://schemas.microsoft.com/office/drawing/2014/main" id="{CE5C71E6-6D1A-48D1-A541-AC09253FECA6}"/>
+              </a:ext>
+            </a:extLst>
+          </p:cNvPr>
+          <p:cNvPicPr>
+            <a:picLocks noChangeAspect="1"/>
+          </p:cNvPicPr>
+          <p:nvPr/>
+        </p:nvPicPr>
+        <p:blipFill>
+          <a:blip r:embed="rId4">
+            <a:extLst>
+              <a:ext uri="{28A0092B-C50C-407E-A947-70E740481C1C}">
+                <a14:useLocalDpi xmlns:a14="http://schemas.microsoft.com/office/drawing/2010/main" val="0"/>
+              </a:ext>
+            </a:extLst>
+          </a:blip>
+          <a:stretch>
+            <a:fillRect/>
+          </a:stretch>
+        </p:blipFill>
+        <p:spPr>
+          <a:xfrm>
+            <a:off x="2342583" y="1524000"/>
+            <a:ext cx="9021702" cy="3462555"/>
+          </a:xfrm>
+          <a:prstGeom prst="rect">
+            <a:avLst/>
+          </a:prstGeom>
+        </p:spPr>
+      </p:pic>
     </p:spTree>
     <p:extLst>
       <p:ext uri="{BB962C8B-B14F-4D97-AF65-F5344CB8AC3E}">
-        <p14:creationId xmlns:p14="http://schemas.microsoft.com/office/powerpoint/2010/main" val="2242408723"/>
+        <p14:creationId xmlns:p14="http://schemas.microsoft.com/office/powerpoint/2010/main" val="4207180243"/>
       </p:ext>
     </p:extLst>
   </p:cSld>
@@ -14718,7 +15893,7 @@
           <p:nvPr/>
         </p:nvPicPr>
         <p:blipFill>
-          <a:blip r:embed="rId2">
+          <a:blip r:embed="rId3">
             <a:extLst>
               <a:ext uri="{28A0092B-C50C-407E-A947-70E740481C1C}">
                 <a14:useLocalDpi xmlns:a14="http://schemas.microsoft.com/office/drawing/2010/main" val="0"/>
@@ -14739,10 +15914,251 @@
           </a:prstGeom>
         </p:spPr>
       </p:pic>
+      <p:pic>
+        <p:nvPicPr>
+          <p:cNvPr id="5" name="Picture 4" descr="A screen shot of a computer&#10;&#10;Description automatically generated">
+            <a:extLst>
+              <a:ext uri="{FF2B5EF4-FFF2-40B4-BE49-F238E27FC236}">
+                <a16:creationId xmlns:a16="http://schemas.microsoft.com/office/drawing/2014/main" id="{4519BEBE-7341-43F4-8166-AD35333C65A8}"/>
+              </a:ext>
+            </a:extLst>
+          </p:cNvPr>
+          <p:cNvPicPr>
+            <a:picLocks noChangeAspect="1"/>
+          </p:cNvPicPr>
+          <p:nvPr/>
+        </p:nvPicPr>
+        <p:blipFill>
+          <a:blip r:embed="rId4">
+            <a:extLst>
+              <a:ext uri="{28A0092B-C50C-407E-A947-70E740481C1C}">
+                <a14:useLocalDpi xmlns:a14="http://schemas.microsoft.com/office/drawing/2010/main" val="0"/>
+              </a:ext>
+            </a:extLst>
+          </a:blip>
+          <a:stretch>
+            <a:fillRect/>
+          </a:stretch>
+        </p:blipFill>
+        <p:spPr>
+          <a:xfrm>
+            <a:off x="2357419" y="1659467"/>
+            <a:ext cx="8787279" cy="3167260"/>
+          </a:xfrm>
+          <a:prstGeom prst="rect">
+            <a:avLst/>
+          </a:prstGeom>
+        </p:spPr>
+      </p:pic>
     </p:spTree>
     <p:extLst>
       <p:ext uri="{BB962C8B-B14F-4D97-AF65-F5344CB8AC3E}">
-        <p14:creationId xmlns:p14="http://schemas.microsoft.com/office/powerpoint/2010/main" val="3214577973"/>
+        <p14:creationId xmlns:p14="http://schemas.microsoft.com/office/powerpoint/2010/main" val="3412922996"/>
+      </p:ext>
+    </p:extLst>
+  </p:cSld>
+  <p:clrMapOvr>
+    <a:masterClrMapping/>
+  </p:clrMapOvr>
+</p:sld>
+</file>
+
+<file path=ppt/slides/slide39.xml><?xml version="1.0" encoding="utf-8"?>
+<p:sld xmlns:a="http://schemas.openxmlformats.org/drawingml/2006/main" xmlns:r="http://schemas.openxmlformats.org/officeDocument/2006/relationships" xmlns:p="http://schemas.openxmlformats.org/presentationml/2006/main">
+  <p:cSld>
+    <p:spTree>
+      <p:nvGrpSpPr>
+        <p:cNvPr id="1" name=""/>
+        <p:cNvGrpSpPr/>
+        <p:nvPr/>
+      </p:nvGrpSpPr>
+      <p:grpSpPr>
+        <a:xfrm>
+          <a:off x="0" y="0"/>
+          <a:ext cx="0" cy="0"/>
+          <a:chOff x="0" y="0"/>
+          <a:chExt cx="0" cy="0"/>
+        </a:xfrm>
+      </p:grpSpPr>
+      <p:sp>
+        <p:nvSpPr>
+          <p:cNvPr id="3" name="Content Placeholder 2">
+            <a:extLst>
+              <a:ext uri="{FF2B5EF4-FFF2-40B4-BE49-F238E27FC236}">
+                <a16:creationId xmlns:a16="http://schemas.microsoft.com/office/drawing/2014/main" id="{34F56F19-3688-4FD9-90B1-6AF71AF4F7AD}"/>
+              </a:ext>
+            </a:extLst>
+          </p:cNvPr>
+          <p:cNvSpPr>
+            <a:spLocks noGrp="1"/>
+          </p:cNvSpPr>
+          <p:nvPr>
+            <p:ph idx="1"/>
+          </p:nvPr>
+        </p:nvSpPr>
+        <p:spPr>
+          <a:xfrm>
+            <a:off x="8114270" y="6249816"/>
+            <a:ext cx="4077730" cy="608184"/>
+          </a:xfrm>
+        </p:spPr>
+        <p:txBody>
+          <a:bodyPr>
+            <a:normAutofit fontScale="92500" lnSpcReduction="10000"/>
+          </a:bodyPr>
+          <a:lstStyle/>
+          <a:p>
+            <a:pPr marL="0" indent="0" algn="ctr">
+              <a:buNone/>
+            </a:pPr>
+            <a:endParaRPr lang="en-US" sz="1800" b="1" dirty="0">
+              <a:latin typeface="Lucida Fax" panose="02060602050505020204" pitchFamily="18" charset="0"/>
+            </a:endParaRPr>
+          </a:p>
+          <a:p>
+            <a:pPr marL="0" indent="0" algn="ctr">
+              <a:buNone/>
+            </a:pPr>
+            <a:r>
+              <a:rPr lang="en-US" sz="1500" b="1" dirty="0">
+                <a:solidFill>
+                  <a:srgbClr val="262626"/>
+                </a:solidFill>
+                <a:latin typeface="Lucida Fax" panose="02060602050505020204" pitchFamily="18" charset="0"/>
+              </a:rPr>
+              <a:t>Big Data Health CSE-6250-O01 - Team 11</a:t>
+            </a:r>
+          </a:p>
+        </p:txBody>
+      </p:sp>
+      <p:sp>
+        <p:nvSpPr>
+          <p:cNvPr id="4" name="Right Triangle 3">
+            <a:extLst>
+              <a:ext uri="{FF2B5EF4-FFF2-40B4-BE49-F238E27FC236}">
+                <a16:creationId xmlns:a16="http://schemas.microsoft.com/office/drawing/2014/main" id="{86ACE1F6-E9A8-44F3-8A3E-1CC3DDCB0936}"/>
+              </a:ext>
+            </a:extLst>
+          </p:cNvPr>
+          <p:cNvSpPr/>
+          <p:nvPr/>
+        </p:nvSpPr>
+        <p:spPr>
+          <a:xfrm rot="5400000">
+            <a:off x="-1960608" y="1960607"/>
+            <a:ext cx="6005387" cy="2084173"/>
+          </a:xfrm>
+          <a:prstGeom prst="rtTriangle">
+            <a:avLst/>
+          </a:prstGeom>
+          <a:solidFill>
+            <a:srgbClr val="EEB211"/>
+          </a:solidFill>
+          <a:ln>
+            <a:noFill/>
+          </a:ln>
+        </p:spPr>
+        <p:style>
+          <a:lnRef idx="2">
+            <a:schemeClr val="accent1">
+              <a:shade val="50000"/>
+            </a:schemeClr>
+          </a:lnRef>
+          <a:fillRef idx="1">
+            <a:schemeClr val="accent1"/>
+          </a:fillRef>
+          <a:effectRef idx="0">
+            <a:schemeClr val="accent1"/>
+          </a:effectRef>
+          <a:fontRef idx="minor">
+            <a:schemeClr val="lt1"/>
+          </a:fontRef>
+        </p:style>
+        <p:txBody>
+          <a:bodyPr rtlCol="0" anchor="ctr"/>
+          <a:lstStyle/>
+          <a:p>
+            <a:pPr algn="ctr"/>
+            <a:endParaRPr lang="en-US" dirty="0"/>
+          </a:p>
+        </p:txBody>
+      </p:sp>
+      <p:pic>
+        <p:nvPicPr>
+          <p:cNvPr id="6" name="Picture 5">
+            <a:extLst>
+              <a:ext uri="{FF2B5EF4-FFF2-40B4-BE49-F238E27FC236}">
+                <a16:creationId xmlns:a16="http://schemas.microsoft.com/office/drawing/2014/main" id="{6D879066-9553-4389-A993-F1410DA706D5}"/>
+              </a:ext>
+            </a:extLst>
+          </p:cNvPr>
+          <p:cNvPicPr>
+            <a:picLocks noChangeAspect="1"/>
+          </p:cNvPicPr>
+          <p:nvPr/>
+        </p:nvPicPr>
+        <p:blipFill>
+          <a:blip r:embed="rId3">
+            <a:extLst>
+              <a:ext uri="{28A0092B-C50C-407E-A947-70E740481C1C}">
+                <a14:useLocalDpi xmlns:a14="http://schemas.microsoft.com/office/drawing/2010/main" val="0"/>
+              </a:ext>
+            </a:extLst>
+          </a:blip>
+          <a:stretch>
+            <a:fillRect/>
+          </a:stretch>
+        </p:blipFill>
+        <p:spPr>
+          <a:xfrm>
+            <a:off x="245075" y="0"/>
+            <a:ext cx="1303638" cy="1303638"/>
+          </a:xfrm>
+          <a:prstGeom prst="rect">
+            <a:avLst/>
+          </a:prstGeom>
+        </p:spPr>
+      </p:pic>
+      <p:pic>
+        <p:nvPicPr>
+          <p:cNvPr id="7" name="Picture 6" descr="A screenshot of a cell phone&#10;&#10;Description automatically generated">
+            <a:extLst>
+              <a:ext uri="{FF2B5EF4-FFF2-40B4-BE49-F238E27FC236}">
+                <a16:creationId xmlns:a16="http://schemas.microsoft.com/office/drawing/2014/main" id="{CFA5586F-71A5-44AD-9F9B-882E6560A952}"/>
+              </a:ext>
+            </a:extLst>
+          </p:cNvPr>
+          <p:cNvPicPr>
+            <a:picLocks noChangeAspect="1"/>
+          </p:cNvPicPr>
+          <p:nvPr/>
+        </p:nvPicPr>
+        <p:blipFill>
+          <a:blip r:embed="rId4">
+            <a:extLst>
+              <a:ext uri="{28A0092B-C50C-407E-A947-70E740481C1C}">
+                <a14:useLocalDpi xmlns:a14="http://schemas.microsoft.com/office/drawing/2010/main" val="0"/>
+              </a:ext>
+            </a:extLst>
+          </a:blip>
+          <a:stretch>
+            <a:fillRect/>
+          </a:stretch>
+        </p:blipFill>
+        <p:spPr>
+          <a:xfrm>
+            <a:off x="2084173" y="1608666"/>
+            <a:ext cx="9159583" cy="3331412"/>
+          </a:xfrm>
+          <a:prstGeom prst="rect">
+            <a:avLst/>
+          </a:prstGeom>
+        </p:spPr>
+      </p:pic>
+    </p:spTree>
+    <p:extLst>
+      <p:ext uri="{BB962C8B-B14F-4D97-AF65-F5344CB8AC3E}">
+        <p14:creationId xmlns:p14="http://schemas.microsoft.com/office/powerpoint/2010/main" val="2826628520"/>
       </p:ext>
     </p:extLst>
   </p:cSld>
@@ -14978,6 +16394,1748 @@
     <p:extLst>
       <p:ext uri="{BB962C8B-B14F-4D97-AF65-F5344CB8AC3E}">
         <p14:creationId xmlns:p14="http://schemas.microsoft.com/office/powerpoint/2010/main" val="2416261239"/>
+      </p:ext>
+    </p:extLst>
+  </p:cSld>
+  <p:clrMapOvr>
+    <a:masterClrMapping/>
+  </p:clrMapOvr>
+</p:sld>
+</file>
+
+<file path=ppt/slides/slide40.xml><?xml version="1.0" encoding="utf-8"?>
+<p:sld xmlns:a="http://schemas.openxmlformats.org/drawingml/2006/main" xmlns:r="http://schemas.openxmlformats.org/officeDocument/2006/relationships" xmlns:p="http://schemas.openxmlformats.org/presentationml/2006/main">
+  <p:cSld>
+    <p:spTree>
+      <p:nvGrpSpPr>
+        <p:cNvPr id="1" name=""/>
+        <p:cNvGrpSpPr/>
+        <p:nvPr/>
+      </p:nvGrpSpPr>
+      <p:grpSpPr>
+        <a:xfrm>
+          <a:off x="0" y="0"/>
+          <a:ext cx="0" cy="0"/>
+          <a:chOff x="0" y="0"/>
+          <a:chExt cx="0" cy="0"/>
+        </a:xfrm>
+      </p:grpSpPr>
+      <p:sp>
+        <p:nvSpPr>
+          <p:cNvPr id="3" name="Content Placeholder 2">
+            <a:extLst>
+              <a:ext uri="{FF2B5EF4-FFF2-40B4-BE49-F238E27FC236}">
+                <a16:creationId xmlns:a16="http://schemas.microsoft.com/office/drawing/2014/main" id="{34F56F19-3688-4FD9-90B1-6AF71AF4F7AD}"/>
+              </a:ext>
+            </a:extLst>
+          </p:cNvPr>
+          <p:cNvSpPr>
+            <a:spLocks noGrp="1"/>
+          </p:cNvSpPr>
+          <p:nvPr>
+            <p:ph idx="1"/>
+          </p:nvPr>
+        </p:nvSpPr>
+        <p:spPr>
+          <a:xfrm>
+            <a:off x="8114270" y="6249816"/>
+            <a:ext cx="4077730" cy="608184"/>
+          </a:xfrm>
+        </p:spPr>
+        <p:txBody>
+          <a:bodyPr>
+            <a:normAutofit fontScale="92500" lnSpcReduction="10000"/>
+          </a:bodyPr>
+          <a:lstStyle/>
+          <a:p>
+            <a:pPr marL="0" indent="0" algn="ctr">
+              <a:buNone/>
+            </a:pPr>
+            <a:endParaRPr lang="en-US" sz="1800" b="1" dirty="0">
+              <a:latin typeface="Lucida Fax" panose="02060602050505020204" pitchFamily="18" charset="0"/>
+            </a:endParaRPr>
+          </a:p>
+          <a:p>
+            <a:pPr marL="0" indent="0" algn="ctr">
+              <a:buNone/>
+            </a:pPr>
+            <a:r>
+              <a:rPr lang="en-US" sz="1500" b="1" dirty="0">
+                <a:solidFill>
+                  <a:srgbClr val="262626"/>
+                </a:solidFill>
+                <a:latin typeface="Lucida Fax" panose="02060602050505020204" pitchFamily="18" charset="0"/>
+              </a:rPr>
+              <a:t>Big Data Health CSE-6250-O01 - Team 11</a:t>
+            </a:r>
+          </a:p>
+        </p:txBody>
+      </p:sp>
+      <p:sp>
+        <p:nvSpPr>
+          <p:cNvPr id="4" name="Right Triangle 3">
+            <a:extLst>
+              <a:ext uri="{FF2B5EF4-FFF2-40B4-BE49-F238E27FC236}">
+                <a16:creationId xmlns:a16="http://schemas.microsoft.com/office/drawing/2014/main" id="{86ACE1F6-E9A8-44F3-8A3E-1CC3DDCB0936}"/>
+              </a:ext>
+            </a:extLst>
+          </p:cNvPr>
+          <p:cNvSpPr/>
+          <p:nvPr/>
+        </p:nvSpPr>
+        <p:spPr>
+          <a:xfrm rot="5400000">
+            <a:off x="-1960608" y="1960607"/>
+            <a:ext cx="6005387" cy="2084173"/>
+          </a:xfrm>
+          <a:prstGeom prst="rtTriangle">
+            <a:avLst/>
+          </a:prstGeom>
+          <a:solidFill>
+            <a:srgbClr val="EEB211"/>
+          </a:solidFill>
+          <a:ln>
+            <a:noFill/>
+          </a:ln>
+        </p:spPr>
+        <p:style>
+          <a:lnRef idx="2">
+            <a:schemeClr val="accent1">
+              <a:shade val="50000"/>
+            </a:schemeClr>
+          </a:lnRef>
+          <a:fillRef idx="1">
+            <a:schemeClr val="accent1"/>
+          </a:fillRef>
+          <a:effectRef idx="0">
+            <a:schemeClr val="accent1"/>
+          </a:effectRef>
+          <a:fontRef idx="minor">
+            <a:schemeClr val="lt1"/>
+          </a:fontRef>
+        </p:style>
+        <p:txBody>
+          <a:bodyPr rtlCol="0" anchor="ctr"/>
+          <a:lstStyle/>
+          <a:p>
+            <a:pPr algn="ctr"/>
+            <a:endParaRPr lang="en-US" dirty="0"/>
+          </a:p>
+        </p:txBody>
+      </p:sp>
+      <p:pic>
+        <p:nvPicPr>
+          <p:cNvPr id="6" name="Picture 5">
+            <a:extLst>
+              <a:ext uri="{FF2B5EF4-FFF2-40B4-BE49-F238E27FC236}">
+                <a16:creationId xmlns:a16="http://schemas.microsoft.com/office/drawing/2014/main" id="{6D879066-9553-4389-A993-F1410DA706D5}"/>
+              </a:ext>
+            </a:extLst>
+          </p:cNvPr>
+          <p:cNvPicPr>
+            <a:picLocks noChangeAspect="1"/>
+          </p:cNvPicPr>
+          <p:nvPr/>
+        </p:nvPicPr>
+        <p:blipFill>
+          <a:blip r:embed="rId3">
+            <a:extLst>
+              <a:ext uri="{28A0092B-C50C-407E-A947-70E740481C1C}">
+                <a14:useLocalDpi xmlns:a14="http://schemas.microsoft.com/office/drawing/2010/main" val="0"/>
+              </a:ext>
+            </a:extLst>
+          </a:blip>
+          <a:stretch>
+            <a:fillRect/>
+          </a:stretch>
+        </p:blipFill>
+        <p:spPr>
+          <a:xfrm>
+            <a:off x="245075" y="0"/>
+            <a:ext cx="1303638" cy="1303638"/>
+          </a:xfrm>
+          <a:prstGeom prst="rect">
+            <a:avLst/>
+          </a:prstGeom>
+        </p:spPr>
+      </p:pic>
+      <p:pic>
+        <p:nvPicPr>
+          <p:cNvPr id="5" name="Picture 4" descr="A screenshot of a cell phone&#10;&#10;Description automatically generated">
+            <a:extLst>
+              <a:ext uri="{FF2B5EF4-FFF2-40B4-BE49-F238E27FC236}">
+                <a16:creationId xmlns:a16="http://schemas.microsoft.com/office/drawing/2014/main" id="{4D79480E-C30F-440C-AAEF-1E1DBABA8D9C}"/>
+              </a:ext>
+            </a:extLst>
+          </p:cNvPr>
+          <p:cNvPicPr>
+            <a:picLocks noChangeAspect="1"/>
+          </p:cNvPicPr>
+          <p:nvPr/>
+        </p:nvPicPr>
+        <p:blipFill>
+          <a:blip r:embed="rId4">
+            <a:extLst>
+              <a:ext uri="{28A0092B-C50C-407E-A947-70E740481C1C}">
+                <a14:useLocalDpi xmlns:a14="http://schemas.microsoft.com/office/drawing/2010/main" val="0"/>
+              </a:ext>
+            </a:extLst>
+          </a:blip>
+          <a:stretch>
+            <a:fillRect/>
+          </a:stretch>
+        </p:blipFill>
+        <p:spPr>
+          <a:xfrm>
+            <a:off x="1876885" y="2240418"/>
+            <a:ext cx="9724759" cy="2377163"/>
+          </a:xfrm>
+          <a:prstGeom prst="rect">
+            <a:avLst/>
+          </a:prstGeom>
+        </p:spPr>
+      </p:pic>
+    </p:spTree>
+    <p:extLst>
+      <p:ext uri="{BB962C8B-B14F-4D97-AF65-F5344CB8AC3E}">
+        <p14:creationId xmlns:p14="http://schemas.microsoft.com/office/powerpoint/2010/main" val="3692833179"/>
+      </p:ext>
+    </p:extLst>
+  </p:cSld>
+  <p:clrMapOvr>
+    <a:masterClrMapping/>
+  </p:clrMapOvr>
+</p:sld>
+</file>
+
+<file path=ppt/slides/slide41.xml><?xml version="1.0" encoding="utf-8"?>
+<p:sld xmlns:a="http://schemas.openxmlformats.org/drawingml/2006/main" xmlns:r="http://schemas.openxmlformats.org/officeDocument/2006/relationships" xmlns:p="http://schemas.openxmlformats.org/presentationml/2006/main">
+  <p:cSld>
+    <p:spTree>
+      <p:nvGrpSpPr>
+        <p:cNvPr id="1" name=""/>
+        <p:cNvGrpSpPr/>
+        <p:nvPr/>
+      </p:nvGrpSpPr>
+      <p:grpSpPr>
+        <a:xfrm>
+          <a:off x="0" y="0"/>
+          <a:ext cx="0" cy="0"/>
+          <a:chOff x="0" y="0"/>
+          <a:chExt cx="0" cy="0"/>
+        </a:xfrm>
+      </p:grpSpPr>
+      <p:sp>
+        <p:nvSpPr>
+          <p:cNvPr id="3" name="Content Placeholder 2">
+            <a:extLst>
+              <a:ext uri="{FF2B5EF4-FFF2-40B4-BE49-F238E27FC236}">
+                <a16:creationId xmlns:a16="http://schemas.microsoft.com/office/drawing/2014/main" id="{34F56F19-3688-4FD9-90B1-6AF71AF4F7AD}"/>
+              </a:ext>
+            </a:extLst>
+          </p:cNvPr>
+          <p:cNvSpPr>
+            <a:spLocks noGrp="1"/>
+          </p:cNvSpPr>
+          <p:nvPr>
+            <p:ph idx="1"/>
+          </p:nvPr>
+        </p:nvSpPr>
+        <p:spPr>
+          <a:xfrm>
+            <a:off x="8114270" y="6249816"/>
+            <a:ext cx="4077730" cy="608184"/>
+          </a:xfrm>
+        </p:spPr>
+        <p:txBody>
+          <a:bodyPr>
+            <a:normAutofit fontScale="92500" lnSpcReduction="10000"/>
+          </a:bodyPr>
+          <a:lstStyle/>
+          <a:p>
+            <a:pPr marL="0" indent="0" algn="ctr">
+              <a:buNone/>
+            </a:pPr>
+            <a:endParaRPr lang="en-US" sz="1800" b="1" dirty="0">
+              <a:latin typeface="Lucida Fax" panose="02060602050505020204" pitchFamily="18" charset="0"/>
+            </a:endParaRPr>
+          </a:p>
+          <a:p>
+            <a:pPr marL="0" indent="0" algn="ctr">
+              <a:buNone/>
+            </a:pPr>
+            <a:r>
+              <a:rPr lang="en-US" sz="1500" b="1" dirty="0">
+                <a:solidFill>
+                  <a:srgbClr val="262626"/>
+                </a:solidFill>
+                <a:latin typeface="Lucida Fax" panose="02060602050505020204" pitchFamily="18" charset="0"/>
+              </a:rPr>
+              <a:t>Big Data Health CSE-6250-O01 - Team 11</a:t>
+            </a:r>
+          </a:p>
+        </p:txBody>
+      </p:sp>
+      <p:sp>
+        <p:nvSpPr>
+          <p:cNvPr id="4" name="Right Triangle 3">
+            <a:extLst>
+              <a:ext uri="{FF2B5EF4-FFF2-40B4-BE49-F238E27FC236}">
+                <a16:creationId xmlns:a16="http://schemas.microsoft.com/office/drawing/2014/main" id="{86ACE1F6-E9A8-44F3-8A3E-1CC3DDCB0936}"/>
+              </a:ext>
+            </a:extLst>
+          </p:cNvPr>
+          <p:cNvSpPr/>
+          <p:nvPr/>
+        </p:nvSpPr>
+        <p:spPr>
+          <a:xfrm rot="5400000">
+            <a:off x="-1960608" y="1960607"/>
+            <a:ext cx="6005387" cy="2084173"/>
+          </a:xfrm>
+          <a:prstGeom prst="rtTriangle">
+            <a:avLst/>
+          </a:prstGeom>
+          <a:solidFill>
+            <a:srgbClr val="EEB211"/>
+          </a:solidFill>
+          <a:ln>
+            <a:noFill/>
+          </a:ln>
+        </p:spPr>
+        <p:style>
+          <a:lnRef idx="2">
+            <a:schemeClr val="accent1">
+              <a:shade val="50000"/>
+            </a:schemeClr>
+          </a:lnRef>
+          <a:fillRef idx="1">
+            <a:schemeClr val="accent1"/>
+          </a:fillRef>
+          <a:effectRef idx="0">
+            <a:schemeClr val="accent1"/>
+          </a:effectRef>
+          <a:fontRef idx="minor">
+            <a:schemeClr val="lt1"/>
+          </a:fontRef>
+        </p:style>
+        <p:txBody>
+          <a:bodyPr rtlCol="0" anchor="ctr"/>
+          <a:lstStyle/>
+          <a:p>
+            <a:pPr algn="ctr"/>
+            <a:endParaRPr lang="en-US" dirty="0"/>
+          </a:p>
+        </p:txBody>
+      </p:sp>
+      <p:pic>
+        <p:nvPicPr>
+          <p:cNvPr id="6" name="Picture 5">
+            <a:extLst>
+              <a:ext uri="{FF2B5EF4-FFF2-40B4-BE49-F238E27FC236}">
+                <a16:creationId xmlns:a16="http://schemas.microsoft.com/office/drawing/2014/main" id="{6D879066-9553-4389-A993-F1410DA706D5}"/>
+              </a:ext>
+            </a:extLst>
+          </p:cNvPr>
+          <p:cNvPicPr>
+            <a:picLocks noChangeAspect="1"/>
+          </p:cNvPicPr>
+          <p:nvPr/>
+        </p:nvPicPr>
+        <p:blipFill>
+          <a:blip r:embed="rId3">
+            <a:extLst>
+              <a:ext uri="{28A0092B-C50C-407E-A947-70E740481C1C}">
+                <a14:useLocalDpi xmlns:a14="http://schemas.microsoft.com/office/drawing/2010/main" val="0"/>
+              </a:ext>
+            </a:extLst>
+          </a:blip>
+          <a:stretch>
+            <a:fillRect/>
+          </a:stretch>
+        </p:blipFill>
+        <p:spPr>
+          <a:xfrm>
+            <a:off x="245075" y="0"/>
+            <a:ext cx="1303638" cy="1303638"/>
+          </a:xfrm>
+          <a:prstGeom prst="rect">
+            <a:avLst/>
+          </a:prstGeom>
+        </p:spPr>
+      </p:pic>
+      <p:pic>
+        <p:nvPicPr>
+          <p:cNvPr id="7" name="Picture 6" descr="A close up of a map&#10;&#10;Description automatically generated">
+            <a:extLst>
+              <a:ext uri="{FF2B5EF4-FFF2-40B4-BE49-F238E27FC236}">
+                <a16:creationId xmlns:a16="http://schemas.microsoft.com/office/drawing/2014/main" id="{7EEFD38F-FB3C-40E2-B1AB-D8E12D03F66D}"/>
+              </a:ext>
+            </a:extLst>
+          </p:cNvPr>
+          <p:cNvPicPr>
+            <a:picLocks noChangeAspect="1"/>
+          </p:cNvPicPr>
+          <p:nvPr/>
+        </p:nvPicPr>
+        <p:blipFill>
+          <a:blip r:embed="rId4">
+            <a:extLst>
+              <a:ext uri="{28A0092B-C50C-407E-A947-70E740481C1C}">
+                <a14:useLocalDpi xmlns:a14="http://schemas.microsoft.com/office/drawing/2010/main" val="0"/>
+              </a:ext>
+            </a:extLst>
+          </a:blip>
+          <a:stretch>
+            <a:fillRect/>
+          </a:stretch>
+        </p:blipFill>
+        <p:spPr>
+          <a:xfrm>
+            <a:off x="1901516" y="2475962"/>
+            <a:ext cx="9139018" cy="1906076"/>
+          </a:xfrm>
+          <a:prstGeom prst="rect">
+            <a:avLst/>
+          </a:prstGeom>
+        </p:spPr>
+      </p:pic>
+    </p:spTree>
+    <p:extLst>
+      <p:ext uri="{BB962C8B-B14F-4D97-AF65-F5344CB8AC3E}">
+        <p14:creationId xmlns:p14="http://schemas.microsoft.com/office/powerpoint/2010/main" val="1443225378"/>
+      </p:ext>
+    </p:extLst>
+  </p:cSld>
+  <p:clrMapOvr>
+    <a:masterClrMapping/>
+  </p:clrMapOvr>
+</p:sld>
+</file>
+
+<file path=ppt/slides/slide42.xml><?xml version="1.0" encoding="utf-8"?>
+<p:sld xmlns:a="http://schemas.openxmlformats.org/drawingml/2006/main" xmlns:r="http://schemas.openxmlformats.org/officeDocument/2006/relationships" xmlns:p="http://schemas.openxmlformats.org/presentationml/2006/main">
+  <p:cSld>
+    <p:spTree>
+      <p:nvGrpSpPr>
+        <p:cNvPr id="1" name=""/>
+        <p:cNvGrpSpPr/>
+        <p:nvPr/>
+      </p:nvGrpSpPr>
+      <p:grpSpPr>
+        <a:xfrm>
+          <a:off x="0" y="0"/>
+          <a:ext cx="0" cy="0"/>
+          <a:chOff x="0" y="0"/>
+          <a:chExt cx="0" cy="0"/>
+        </a:xfrm>
+      </p:grpSpPr>
+      <p:sp>
+        <p:nvSpPr>
+          <p:cNvPr id="3" name="Content Placeholder 2">
+            <a:extLst>
+              <a:ext uri="{FF2B5EF4-FFF2-40B4-BE49-F238E27FC236}">
+                <a16:creationId xmlns:a16="http://schemas.microsoft.com/office/drawing/2014/main" id="{34F56F19-3688-4FD9-90B1-6AF71AF4F7AD}"/>
+              </a:ext>
+            </a:extLst>
+          </p:cNvPr>
+          <p:cNvSpPr>
+            <a:spLocks noGrp="1"/>
+          </p:cNvSpPr>
+          <p:nvPr>
+            <p:ph idx="1"/>
+          </p:nvPr>
+        </p:nvSpPr>
+        <p:spPr>
+          <a:xfrm>
+            <a:off x="8114270" y="6249816"/>
+            <a:ext cx="4077730" cy="608184"/>
+          </a:xfrm>
+        </p:spPr>
+        <p:txBody>
+          <a:bodyPr>
+            <a:normAutofit fontScale="92500" lnSpcReduction="10000"/>
+          </a:bodyPr>
+          <a:lstStyle/>
+          <a:p>
+            <a:pPr marL="0" indent="0" algn="ctr">
+              <a:buNone/>
+            </a:pPr>
+            <a:endParaRPr lang="en-US" sz="1800" b="1" dirty="0">
+              <a:latin typeface="Lucida Fax" panose="02060602050505020204" pitchFamily="18" charset="0"/>
+            </a:endParaRPr>
+          </a:p>
+          <a:p>
+            <a:pPr marL="0" indent="0" algn="ctr">
+              <a:buNone/>
+            </a:pPr>
+            <a:r>
+              <a:rPr lang="en-US" sz="1500" b="1" dirty="0">
+                <a:solidFill>
+                  <a:srgbClr val="262626"/>
+                </a:solidFill>
+                <a:latin typeface="Lucida Fax" panose="02060602050505020204" pitchFamily="18" charset="0"/>
+              </a:rPr>
+              <a:t>Big Data Health CSE-6250-O01 - Team 11</a:t>
+            </a:r>
+          </a:p>
+        </p:txBody>
+      </p:sp>
+      <p:sp>
+        <p:nvSpPr>
+          <p:cNvPr id="4" name="Right Triangle 3">
+            <a:extLst>
+              <a:ext uri="{FF2B5EF4-FFF2-40B4-BE49-F238E27FC236}">
+                <a16:creationId xmlns:a16="http://schemas.microsoft.com/office/drawing/2014/main" id="{86ACE1F6-E9A8-44F3-8A3E-1CC3DDCB0936}"/>
+              </a:ext>
+            </a:extLst>
+          </p:cNvPr>
+          <p:cNvSpPr/>
+          <p:nvPr/>
+        </p:nvSpPr>
+        <p:spPr>
+          <a:xfrm rot="5400000">
+            <a:off x="-1960608" y="1960607"/>
+            <a:ext cx="6005387" cy="2084173"/>
+          </a:xfrm>
+          <a:prstGeom prst="rtTriangle">
+            <a:avLst/>
+          </a:prstGeom>
+          <a:solidFill>
+            <a:srgbClr val="EEB211"/>
+          </a:solidFill>
+          <a:ln>
+            <a:noFill/>
+          </a:ln>
+        </p:spPr>
+        <p:style>
+          <a:lnRef idx="2">
+            <a:schemeClr val="accent1">
+              <a:shade val="50000"/>
+            </a:schemeClr>
+          </a:lnRef>
+          <a:fillRef idx="1">
+            <a:schemeClr val="accent1"/>
+          </a:fillRef>
+          <a:effectRef idx="0">
+            <a:schemeClr val="accent1"/>
+          </a:effectRef>
+          <a:fontRef idx="minor">
+            <a:schemeClr val="lt1"/>
+          </a:fontRef>
+        </p:style>
+        <p:txBody>
+          <a:bodyPr rtlCol="0" anchor="ctr"/>
+          <a:lstStyle/>
+          <a:p>
+            <a:pPr algn="ctr"/>
+            <a:endParaRPr lang="en-US" dirty="0"/>
+          </a:p>
+        </p:txBody>
+      </p:sp>
+      <p:pic>
+        <p:nvPicPr>
+          <p:cNvPr id="6" name="Picture 5">
+            <a:extLst>
+              <a:ext uri="{FF2B5EF4-FFF2-40B4-BE49-F238E27FC236}">
+                <a16:creationId xmlns:a16="http://schemas.microsoft.com/office/drawing/2014/main" id="{6D879066-9553-4389-A993-F1410DA706D5}"/>
+              </a:ext>
+            </a:extLst>
+          </p:cNvPr>
+          <p:cNvPicPr>
+            <a:picLocks noChangeAspect="1"/>
+          </p:cNvPicPr>
+          <p:nvPr/>
+        </p:nvPicPr>
+        <p:blipFill>
+          <a:blip r:embed="rId3">
+            <a:extLst>
+              <a:ext uri="{28A0092B-C50C-407E-A947-70E740481C1C}">
+                <a14:useLocalDpi xmlns:a14="http://schemas.microsoft.com/office/drawing/2010/main" val="0"/>
+              </a:ext>
+            </a:extLst>
+          </a:blip>
+          <a:stretch>
+            <a:fillRect/>
+          </a:stretch>
+        </p:blipFill>
+        <p:spPr>
+          <a:xfrm>
+            <a:off x="245075" y="0"/>
+            <a:ext cx="1303638" cy="1303638"/>
+          </a:xfrm>
+          <a:prstGeom prst="rect">
+            <a:avLst/>
+          </a:prstGeom>
+        </p:spPr>
+      </p:pic>
+      <p:pic>
+        <p:nvPicPr>
+          <p:cNvPr id="5" name="Picture 4" descr="A close up of a map&#10;&#10;Description automatically generated">
+            <a:extLst>
+              <a:ext uri="{FF2B5EF4-FFF2-40B4-BE49-F238E27FC236}">
+                <a16:creationId xmlns:a16="http://schemas.microsoft.com/office/drawing/2014/main" id="{430B826B-5255-4B36-AAF0-1D330B1AF9C8}"/>
+              </a:ext>
+            </a:extLst>
+          </p:cNvPr>
+          <p:cNvPicPr>
+            <a:picLocks noChangeAspect="1"/>
+          </p:cNvPicPr>
+          <p:nvPr/>
+        </p:nvPicPr>
+        <p:blipFill>
+          <a:blip r:embed="rId4">
+            <a:extLst>
+              <a:ext uri="{28A0092B-C50C-407E-A947-70E740481C1C}">
+                <a14:useLocalDpi xmlns:a14="http://schemas.microsoft.com/office/drawing/2010/main" val="0"/>
+              </a:ext>
+            </a:extLst>
+          </a:blip>
+          <a:stretch>
+            <a:fillRect/>
+          </a:stretch>
+        </p:blipFill>
+        <p:spPr>
+          <a:xfrm>
+            <a:off x="2582666" y="1146639"/>
+            <a:ext cx="8353040" cy="4564722"/>
+          </a:xfrm>
+          <a:prstGeom prst="rect">
+            <a:avLst/>
+          </a:prstGeom>
+        </p:spPr>
+      </p:pic>
+    </p:spTree>
+    <p:extLst>
+      <p:ext uri="{BB962C8B-B14F-4D97-AF65-F5344CB8AC3E}">
+        <p14:creationId xmlns:p14="http://schemas.microsoft.com/office/powerpoint/2010/main" val="1901112398"/>
+      </p:ext>
+    </p:extLst>
+  </p:cSld>
+  <p:clrMapOvr>
+    <a:masterClrMapping/>
+  </p:clrMapOvr>
+</p:sld>
+</file>
+
+<file path=ppt/slides/slide43.xml><?xml version="1.0" encoding="utf-8"?>
+<p:sld xmlns:a="http://schemas.openxmlformats.org/drawingml/2006/main" xmlns:r="http://schemas.openxmlformats.org/officeDocument/2006/relationships" xmlns:p="http://schemas.openxmlformats.org/presentationml/2006/main">
+  <p:cSld>
+    <p:spTree>
+      <p:nvGrpSpPr>
+        <p:cNvPr id="1" name=""/>
+        <p:cNvGrpSpPr/>
+        <p:nvPr/>
+      </p:nvGrpSpPr>
+      <p:grpSpPr>
+        <a:xfrm>
+          <a:off x="0" y="0"/>
+          <a:ext cx="0" cy="0"/>
+          <a:chOff x="0" y="0"/>
+          <a:chExt cx="0" cy="0"/>
+        </a:xfrm>
+      </p:grpSpPr>
+      <p:sp>
+        <p:nvSpPr>
+          <p:cNvPr id="3" name="Content Placeholder 2">
+            <a:extLst>
+              <a:ext uri="{FF2B5EF4-FFF2-40B4-BE49-F238E27FC236}">
+                <a16:creationId xmlns:a16="http://schemas.microsoft.com/office/drawing/2014/main" id="{34F56F19-3688-4FD9-90B1-6AF71AF4F7AD}"/>
+              </a:ext>
+            </a:extLst>
+          </p:cNvPr>
+          <p:cNvSpPr>
+            <a:spLocks noGrp="1"/>
+          </p:cNvSpPr>
+          <p:nvPr>
+            <p:ph idx="1"/>
+          </p:nvPr>
+        </p:nvSpPr>
+        <p:spPr>
+          <a:xfrm>
+            <a:off x="8114270" y="6249816"/>
+            <a:ext cx="4077730" cy="608184"/>
+          </a:xfrm>
+        </p:spPr>
+        <p:txBody>
+          <a:bodyPr>
+            <a:normAutofit fontScale="92500" lnSpcReduction="10000"/>
+          </a:bodyPr>
+          <a:lstStyle/>
+          <a:p>
+            <a:pPr marL="0" indent="0" algn="ctr">
+              <a:buNone/>
+            </a:pPr>
+            <a:endParaRPr lang="en-US" sz="1800" b="1" dirty="0">
+              <a:latin typeface="Lucida Fax" panose="02060602050505020204" pitchFamily="18" charset="0"/>
+            </a:endParaRPr>
+          </a:p>
+          <a:p>
+            <a:pPr marL="0" indent="0" algn="ctr">
+              <a:buNone/>
+            </a:pPr>
+            <a:r>
+              <a:rPr lang="en-US" sz="1500" b="1" dirty="0">
+                <a:solidFill>
+                  <a:srgbClr val="262626"/>
+                </a:solidFill>
+                <a:latin typeface="Lucida Fax" panose="02060602050505020204" pitchFamily="18" charset="0"/>
+              </a:rPr>
+              <a:t>Big Data Health CSE-6250-O01 - Team 11</a:t>
+            </a:r>
+          </a:p>
+        </p:txBody>
+      </p:sp>
+      <p:sp>
+        <p:nvSpPr>
+          <p:cNvPr id="4" name="Right Triangle 3">
+            <a:extLst>
+              <a:ext uri="{FF2B5EF4-FFF2-40B4-BE49-F238E27FC236}">
+                <a16:creationId xmlns:a16="http://schemas.microsoft.com/office/drawing/2014/main" id="{86ACE1F6-E9A8-44F3-8A3E-1CC3DDCB0936}"/>
+              </a:ext>
+            </a:extLst>
+          </p:cNvPr>
+          <p:cNvSpPr/>
+          <p:nvPr/>
+        </p:nvSpPr>
+        <p:spPr>
+          <a:xfrm rot="5400000">
+            <a:off x="-1960608" y="1960607"/>
+            <a:ext cx="6005387" cy="2084173"/>
+          </a:xfrm>
+          <a:prstGeom prst="rtTriangle">
+            <a:avLst/>
+          </a:prstGeom>
+          <a:solidFill>
+            <a:srgbClr val="EEB211"/>
+          </a:solidFill>
+          <a:ln>
+            <a:noFill/>
+          </a:ln>
+        </p:spPr>
+        <p:style>
+          <a:lnRef idx="2">
+            <a:schemeClr val="accent1">
+              <a:shade val="50000"/>
+            </a:schemeClr>
+          </a:lnRef>
+          <a:fillRef idx="1">
+            <a:schemeClr val="accent1"/>
+          </a:fillRef>
+          <a:effectRef idx="0">
+            <a:schemeClr val="accent1"/>
+          </a:effectRef>
+          <a:fontRef idx="minor">
+            <a:schemeClr val="lt1"/>
+          </a:fontRef>
+        </p:style>
+        <p:txBody>
+          <a:bodyPr rtlCol="0" anchor="ctr"/>
+          <a:lstStyle/>
+          <a:p>
+            <a:pPr algn="ctr"/>
+            <a:endParaRPr lang="en-US" dirty="0"/>
+          </a:p>
+        </p:txBody>
+      </p:sp>
+      <p:pic>
+        <p:nvPicPr>
+          <p:cNvPr id="6" name="Picture 5">
+            <a:extLst>
+              <a:ext uri="{FF2B5EF4-FFF2-40B4-BE49-F238E27FC236}">
+                <a16:creationId xmlns:a16="http://schemas.microsoft.com/office/drawing/2014/main" id="{6D879066-9553-4389-A993-F1410DA706D5}"/>
+              </a:ext>
+            </a:extLst>
+          </p:cNvPr>
+          <p:cNvPicPr>
+            <a:picLocks noChangeAspect="1"/>
+          </p:cNvPicPr>
+          <p:nvPr/>
+        </p:nvPicPr>
+        <p:blipFill>
+          <a:blip r:embed="rId3">
+            <a:extLst>
+              <a:ext uri="{28A0092B-C50C-407E-A947-70E740481C1C}">
+                <a14:useLocalDpi xmlns:a14="http://schemas.microsoft.com/office/drawing/2010/main" val="0"/>
+              </a:ext>
+            </a:extLst>
+          </a:blip>
+          <a:stretch>
+            <a:fillRect/>
+          </a:stretch>
+        </p:blipFill>
+        <p:spPr>
+          <a:xfrm>
+            <a:off x="245075" y="0"/>
+            <a:ext cx="1303638" cy="1303638"/>
+          </a:xfrm>
+          <a:prstGeom prst="rect">
+            <a:avLst/>
+          </a:prstGeom>
+        </p:spPr>
+      </p:pic>
+      <p:pic>
+        <p:nvPicPr>
+          <p:cNvPr id="7" name="Picture 6" descr="A picture containing display&#10;&#10;Description automatically generated">
+            <a:extLst>
+              <a:ext uri="{FF2B5EF4-FFF2-40B4-BE49-F238E27FC236}">
+                <a16:creationId xmlns:a16="http://schemas.microsoft.com/office/drawing/2014/main" id="{B7C85BCA-53DC-40DB-B407-1693E402B0EC}"/>
+              </a:ext>
+            </a:extLst>
+          </p:cNvPr>
+          <p:cNvPicPr>
+            <a:picLocks noChangeAspect="1"/>
+          </p:cNvPicPr>
+          <p:nvPr/>
+        </p:nvPicPr>
+        <p:blipFill>
+          <a:blip r:embed="rId4">
+            <a:extLst>
+              <a:ext uri="{28A0092B-C50C-407E-A947-70E740481C1C}">
+                <a14:useLocalDpi xmlns:a14="http://schemas.microsoft.com/office/drawing/2010/main" val="0"/>
+              </a:ext>
+            </a:extLst>
+          </a:blip>
+          <a:stretch>
+            <a:fillRect/>
+          </a:stretch>
+        </p:blipFill>
+        <p:spPr>
+          <a:xfrm>
+            <a:off x="2847854" y="758751"/>
+            <a:ext cx="7729877" cy="5340498"/>
+          </a:xfrm>
+          <a:prstGeom prst="rect">
+            <a:avLst/>
+          </a:prstGeom>
+        </p:spPr>
+      </p:pic>
+    </p:spTree>
+    <p:extLst>
+      <p:ext uri="{BB962C8B-B14F-4D97-AF65-F5344CB8AC3E}">
+        <p14:creationId xmlns:p14="http://schemas.microsoft.com/office/powerpoint/2010/main" val="4049397171"/>
+      </p:ext>
+    </p:extLst>
+  </p:cSld>
+  <p:clrMapOvr>
+    <a:masterClrMapping/>
+  </p:clrMapOvr>
+</p:sld>
+</file>
+
+<file path=ppt/slides/slide44.xml><?xml version="1.0" encoding="utf-8"?>
+<p:sld xmlns:a="http://schemas.openxmlformats.org/drawingml/2006/main" xmlns:r="http://schemas.openxmlformats.org/officeDocument/2006/relationships" xmlns:p="http://schemas.openxmlformats.org/presentationml/2006/main">
+  <p:cSld>
+    <p:spTree>
+      <p:nvGrpSpPr>
+        <p:cNvPr id="1" name=""/>
+        <p:cNvGrpSpPr/>
+        <p:nvPr/>
+      </p:nvGrpSpPr>
+      <p:grpSpPr>
+        <a:xfrm>
+          <a:off x="0" y="0"/>
+          <a:ext cx="0" cy="0"/>
+          <a:chOff x="0" y="0"/>
+          <a:chExt cx="0" cy="0"/>
+        </a:xfrm>
+      </p:grpSpPr>
+      <p:sp>
+        <p:nvSpPr>
+          <p:cNvPr id="3" name="Content Placeholder 2">
+            <a:extLst>
+              <a:ext uri="{FF2B5EF4-FFF2-40B4-BE49-F238E27FC236}">
+                <a16:creationId xmlns:a16="http://schemas.microsoft.com/office/drawing/2014/main" id="{34F56F19-3688-4FD9-90B1-6AF71AF4F7AD}"/>
+              </a:ext>
+            </a:extLst>
+          </p:cNvPr>
+          <p:cNvSpPr>
+            <a:spLocks noGrp="1"/>
+          </p:cNvSpPr>
+          <p:nvPr>
+            <p:ph idx="1"/>
+          </p:nvPr>
+        </p:nvSpPr>
+        <p:spPr>
+          <a:xfrm>
+            <a:off x="8114270" y="6249816"/>
+            <a:ext cx="4077730" cy="608184"/>
+          </a:xfrm>
+        </p:spPr>
+        <p:txBody>
+          <a:bodyPr>
+            <a:normAutofit fontScale="92500" lnSpcReduction="10000"/>
+          </a:bodyPr>
+          <a:lstStyle/>
+          <a:p>
+            <a:pPr marL="0" indent="0" algn="ctr">
+              <a:buNone/>
+            </a:pPr>
+            <a:endParaRPr lang="en-US" sz="1800" b="1" dirty="0">
+              <a:latin typeface="Lucida Fax" panose="02060602050505020204" pitchFamily="18" charset="0"/>
+            </a:endParaRPr>
+          </a:p>
+          <a:p>
+            <a:pPr marL="0" indent="0" algn="ctr">
+              <a:buNone/>
+            </a:pPr>
+            <a:r>
+              <a:rPr lang="en-US" sz="1500" b="1" dirty="0">
+                <a:solidFill>
+                  <a:srgbClr val="262626"/>
+                </a:solidFill>
+                <a:latin typeface="Lucida Fax" panose="02060602050505020204" pitchFamily="18" charset="0"/>
+              </a:rPr>
+              <a:t>Big Data Health CSE-6250-O01 - Team 11</a:t>
+            </a:r>
+          </a:p>
+        </p:txBody>
+      </p:sp>
+      <p:sp>
+        <p:nvSpPr>
+          <p:cNvPr id="4" name="Right Triangle 3">
+            <a:extLst>
+              <a:ext uri="{FF2B5EF4-FFF2-40B4-BE49-F238E27FC236}">
+                <a16:creationId xmlns:a16="http://schemas.microsoft.com/office/drawing/2014/main" id="{86ACE1F6-E9A8-44F3-8A3E-1CC3DDCB0936}"/>
+              </a:ext>
+            </a:extLst>
+          </p:cNvPr>
+          <p:cNvSpPr/>
+          <p:nvPr/>
+        </p:nvSpPr>
+        <p:spPr>
+          <a:xfrm rot="5400000">
+            <a:off x="-1960608" y="1960607"/>
+            <a:ext cx="6005387" cy="2084173"/>
+          </a:xfrm>
+          <a:prstGeom prst="rtTriangle">
+            <a:avLst/>
+          </a:prstGeom>
+          <a:solidFill>
+            <a:srgbClr val="EEB211"/>
+          </a:solidFill>
+          <a:ln>
+            <a:noFill/>
+          </a:ln>
+        </p:spPr>
+        <p:style>
+          <a:lnRef idx="2">
+            <a:schemeClr val="accent1">
+              <a:shade val="50000"/>
+            </a:schemeClr>
+          </a:lnRef>
+          <a:fillRef idx="1">
+            <a:schemeClr val="accent1"/>
+          </a:fillRef>
+          <a:effectRef idx="0">
+            <a:schemeClr val="accent1"/>
+          </a:effectRef>
+          <a:fontRef idx="minor">
+            <a:schemeClr val="lt1"/>
+          </a:fontRef>
+        </p:style>
+        <p:txBody>
+          <a:bodyPr rtlCol="0" anchor="ctr"/>
+          <a:lstStyle/>
+          <a:p>
+            <a:pPr algn="ctr"/>
+            <a:endParaRPr lang="en-US" dirty="0"/>
+          </a:p>
+        </p:txBody>
+      </p:sp>
+      <p:pic>
+        <p:nvPicPr>
+          <p:cNvPr id="6" name="Picture 5">
+            <a:extLst>
+              <a:ext uri="{FF2B5EF4-FFF2-40B4-BE49-F238E27FC236}">
+                <a16:creationId xmlns:a16="http://schemas.microsoft.com/office/drawing/2014/main" id="{6D879066-9553-4389-A993-F1410DA706D5}"/>
+              </a:ext>
+            </a:extLst>
+          </p:cNvPr>
+          <p:cNvPicPr>
+            <a:picLocks noChangeAspect="1"/>
+          </p:cNvPicPr>
+          <p:nvPr/>
+        </p:nvPicPr>
+        <p:blipFill>
+          <a:blip r:embed="rId3">
+            <a:extLst>
+              <a:ext uri="{28A0092B-C50C-407E-A947-70E740481C1C}">
+                <a14:useLocalDpi xmlns:a14="http://schemas.microsoft.com/office/drawing/2010/main" val="0"/>
+              </a:ext>
+            </a:extLst>
+          </a:blip>
+          <a:stretch>
+            <a:fillRect/>
+          </a:stretch>
+        </p:blipFill>
+        <p:spPr>
+          <a:xfrm>
+            <a:off x="245075" y="0"/>
+            <a:ext cx="1303638" cy="1303638"/>
+          </a:xfrm>
+          <a:prstGeom prst="rect">
+            <a:avLst/>
+          </a:prstGeom>
+        </p:spPr>
+      </p:pic>
+      <p:pic>
+        <p:nvPicPr>
+          <p:cNvPr id="5" name="Picture 4" descr="A picture containing transport&#10;&#10;Description automatically generated">
+            <a:extLst>
+              <a:ext uri="{FF2B5EF4-FFF2-40B4-BE49-F238E27FC236}">
+                <a16:creationId xmlns:a16="http://schemas.microsoft.com/office/drawing/2014/main" id="{0D3ADAC3-975D-4E31-9B22-9CBC7266E72A}"/>
+              </a:ext>
+            </a:extLst>
+          </p:cNvPr>
+          <p:cNvPicPr>
+            <a:picLocks noChangeAspect="1"/>
+          </p:cNvPicPr>
+          <p:nvPr/>
+        </p:nvPicPr>
+        <p:blipFill>
+          <a:blip r:embed="rId4">
+            <a:extLst>
+              <a:ext uri="{28A0092B-C50C-407E-A947-70E740481C1C}">
+                <a14:useLocalDpi xmlns:a14="http://schemas.microsoft.com/office/drawing/2010/main" val="0"/>
+              </a:ext>
+            </a:extLst>
+          </a:blip>
+          <a:stretch>
+            <a:fillRect/>
+          </a:stretch>
+        </p:blipFill>
+        <p:spPr>
+          <a:xfrm>
+            <a:off x="2084173" y="2085506"/>
+            <a:ext cx="8589553" cy="2686988"/>
+          </a:xfrm>
+          <a:prstGeom prst="rect">
+            <a:avLst/>
+          </a:prstGeom>
+        </p:spPr>
+      </p:pic>
+    </p:spTree>
+    <p:extLst>
+      <p:ext uri="{BB962C8B-B14F-4D97-AF65-F5344CB8AC3E}">
+        <p14:creationId xmlns:p14="http://schemas.microsoft.com/office/powerpoint/2010/main" val="2242408723"/>
+      </p:ext>
+    </p:extLst>
+  </p:cSld>
+  <p:clrMapOvr>
+    <a:masterClrMapping/>
+  </p:clrMapOvr>
+</p:sld>
+</file>
+
+<file path=ppt/slides/slide45.xml><?xml version="1.0" encoding="utf-8"?>
+<p:sld xmlns:a="http://schemas.openxmlformats.org/drawingml/2006/main" xmlns:r="http://schemas.openxmlformats.org/officeDocument/2006/relationships" xmlns:p="http://schemas.openxmlformats.org/presentationml/2006/main">
+  <p:cSld>
+    <p:spTree>
+      <p:nvGrpSpPr>
+        <p:cNvPr id="1" name=""/>
+        <p:cNvGrpSpPr/>
+        <p:nvPr/>
+      </p:nvGrpSpPr>
+      <p:grpSpPr>
+        <a:xfrm>
+          <a:off x="0" y="0"/>
+          <a:ext cx="0" cy="0"/>
+          <a:chOff x="0" y="0"/>
+          <a:chExt cx="0" cy="0"/>
+        </a:xfrm>
+      </p:grpSpPr>
+      <p:sp>
+        <p:nvSpPr>
+          <p:cNvPr id="3" name="Content Placeholder 2">
+            <a:extLst>
+              <a:ext uri="{FF2B5EF4-FFF2-40B4-BE49-F238E27FC236}">
+                <a16:creationId xmlns:a16="http://schemas.microsoft.com/office/drawing/2014/main" id="{34F56F19-3688-4FD9-90B1-6AF71AF4F7AD}"/>
+              </a:ext>
+            </a:extLst>
+          </p:cNvPr>
+          <p:cNvSpPr>
+            <a:spLocks noGrp="1"/>
+          </p:cNvSpPr>
+          <p:nvPr>
+            <p:ph idx="1"/>
+          </p:nvPr>
+        </p:nvSpPr>
+        <p:spPr>
+          <a:xfrm>
+            <a:off x="8114270" y="6249816"/>
+            <a:ext cx="4077730" cy="608184"/>
+          </a:xfrm>
+        </p:spPr>
+        <p:txBody>
+          <a:bodyPr>
+            <a:normAutofit fontScale="92500" lnSpcReduction="10000"/>
+          </a:bodyPr>
+          <a:lstStyle/>
+          <a:p>
+            <a:pPr marL="0" indent="0" algn="ctr">
+              <a:buNone/>
+            </a:pPr>
+            <a:endParaRPr lang="en-US" sz="1800" b="1" dirty="0">
+              <a:latin typeface="Lucida Fax" panose="02060602050505020204" pitchFamily="18" charset="0"/>
+            </a:endParaRPr>
+          </a:p>
+          <a:p>
+            <a:pPr marL="0" indent="0" algn="ctr">
+              <a:buNone/>
+            </a:pPr>
+            <a:r>
+              <a:rPr lang="en-US" sz="1500" b="1" dirty="0">
+                <a:solidFill>
+                  <a:srgbClr val="262626"/>
+                </a:solidFill>
+                <a:latin typeface="Lucida Fax" panose="02060602050505020204" pitchFamily="18" charset="0"/>
+              </a:rPr>
+              <a:t>Big Data Health CSE-6250-O01 - Team 11</a:t>
+            </a:r>
+          </a:p>
+        </p:txBody>
+      </p:sp>
+      <p:sp>
+        <p:nvSpPr>
+          <p:cNvPr id="4" name="Right Triangle 3">
+            <a:extLst>
+              <a:ext uri="{FF2B5EF4-FFF2-40B4-BE49-F238E27FC236}">
+                <a16:creationId xmlns:a16="http://schemas.microsoft.com/office/drawing/2014/main" id="{86ACE1F6-E9A8-44F3-8A3E-1CC3DDCB0936}"/>
+              </a:ext>
+            </a:extLst>
+          </p:cNvPr>
+          <p:cNvSpPr/>
+          <p:nvPr/>
+        </p:nvSpPr>
+        <p:spPr>
+          <a:xfrm rot="5400000">
+            <a:off x="-1960608" y="1960607"/>
+            <a:ext cx="6005387" cy="2084173"/>
+          </a:xfrm>
+          <a:prstGeom prst="rtTriangle">
+            <a:avLst/>
+          </a:prstGeom>
+          <a:solidFill>
+            <a:srgbClr val="EEB211"/>
+          </a:solidFill>
+          <a:ln>
+            <a:noFill/>
+          </a:ln>
+        </p:spPr>
+        <p:style>
+          <a:lnRef idx="2">
+            <a:schemeClr val="accent1">
+              <a:shade val="50000"/>
+            </a:schemeClr>
+          </a:lnRef>
+          <a:fillRef idx="1">
+            <a:schemeClr val="accent1"/>
+          </a:fillRef>
+          <a:effectRef idx="0">
+            <a:schemeClr val="accent1"/>
+          </a:effectRef>
+          <a:fontRef idx="minor">
+            <a:schemeClr val="lt1"/>
+          </a:fontRef>
+        </p:style>
+        <p:txBody>
+          <a:bodyPr rtlCol="0" anchor="ctr"/>
+          <a:lstStyle/>
+          <a:p>
+            <a:pPr algn="ctr"/>
+            <a:endParaRPr lang="en-US" dirty="0"/>
+          </a:p>
+        </p:txBody>
+      </p:sp>
+      <p:pic>
+        <p:nvPicPr>
+          <p:cNvPr id="6" name="Picture 5">
+            <a:extLst>
+              <a:ext uri="{FF2B5EF4-FFF2-40B4-BE49-F238E27FC236}">
+                <a16:creationId xmlns:a16="http://schemas.microsoft.com/office/drawing/2014/main" id="{6D879066-9553-4389-A993-F1410DA706D5}"/>
+              </a:ext>
+            </a:extLst>
+          </p:cNvPr>
+          <p:cNvPicPr>
+            <a:picLocks noChangeAspect="1"/>
+          </p:cNvPicPr>
+          <p:nvPr/>
+        </p:nvPicPr>
+        <p:blipFill>
+          <a:blip r:embed="rId3">
+            <a:extLst>
+              <a:ext uri="{28A0092B-C50C-407E-A947-70E740481C1C}">
+                <a14:useLocalDpi xmlns:a14="http://schemas.microsoft.com/office/drawing/2010/main" val="0"/>
+              </a:ext>
+            </a:extLst>
+          </a:blip>
+          <a:stretch>
+            <a:fillRect/>
+          </a:stretch>
+        </p:blipFill>
+        <p:spPr>
+          <a:xfrm>
+            <a:off x="245075" y="0"/>
+            <a:ext cx="1303638" cy="1303638"/>
+          </a:xfrm>
+          <a:prstGeom prst="rect">
+            <a:avLst/>
+          </a:prstGeom>
+        </p:spPr>
+      </p:pic>
+      <p:pic>
+        <p:nvPicPr>
+          <p:cNvPr id="5" name="Picture 4" descr="A close up of a black background&#10;&#10;Description automatically generated">
+            <a:extLst>
+              <a:ext uri="{FF2B5EF4-FFF2-40B4-BE49-F238E27FC236}">
+                <a16:creationId xmlns:a16="http://schemas.microsoft.com/office/drawing/2014/main" id="{031AFCC0-A83A-4B94-9E14-EBAEEF0039B5}"/>
+              </a:ext>
+            </a:extLst>
+          </p:cNvPr>
+          <p:cNvPicPr>
+            <a:picLocks noChangeAspect="1"/>
+          </p:cNvPicPr>
+          <p:nvPr/>
+        </p:nvPicPr>
+        <p:blipFill>
+          <a:blip r:embed="rId4">
+            <a:extLst>
+              <a:ext uri="{28A0092B-C50C-407E-A947-70E740481C1C}">
+                <a14:useLocalDpi xmlns:a14="http://schemas.microsoft.com/office/drawing/2010/main" val="0"/>
+              </a:ext>
+            </a:extLst>
+          </a:blip>
+          <a:stretch>
+            <a:fillRect/>
+          </a:stretch>
+        </p:blipFill>
+        <p:spPr>
+          <a:xfrm>
+            <a:off x="3056513" y="1638050"/>
+            <a:ext cx="6925642" cy="3581900"/>
+          </a:xfrm>
+          <a:prstGeom prst="rect">
+            <a:avLst/>
+          </a:prstGeom>
+        </p:spPr>
+      </p:pic>
+    </p:spTree>
+    <p:extLst>
+      <p:ext uri="{BB962C8B-B14F-4D97-AF65-F5344CB8AC3E}">
+        <p14:creationId xmlns:p14="http://schemas.microsoft.com/office/powerpoint/2010/main" val="1964333428"/>
+      </p:ext>
+    </p:extLst>
+  </p:cSld>
+  <p:clrMapOvr>
+    <a:masterClrMapping/>
+  </p:clrMapOvr>
+</p:sld>
+</file>
+
+<file path=ppt/slides/slide46.xml><?xml version="1.0" encoding="utf-8"?>
+<p:sld xmlns:a="http://schemas.openxmlformats.org/drawingml/2006/main" xmlns:r="http://schemas.openxmlformats.org/officeDocument/2006/relationships" xmlns:p="http://schemas.openxmlformats.org/presentationml/2006/main">
+  <p:cSld>
+    <p:spTree>
+      <p:nvGrpSpPr>
+        <p:cNvPr id="1" name=""/>
+        <p:cNvGrpSpPr/>
+        <p:nvPr/>
+      </p:nvGrpSpPr>
+      <p:grpSpPr>
+        <a:xfrm>
+          <a:off x="0" y="0"/>
+          <a:ext cx="0" cy="0"/>
+          <a:chOff x="0" y="0"/>
+          <a:chExt cx="0" cy="0"/>
+        </a:xfrm>
+      </p:grpSpPr>
+      <p:sp>
+        <p:nvSpPr>
+          <p:cNvPr id="3" name="Content Placeholder 2">
+            <a:extLst>
+              <a:ext uri="{FF2B5EF4-FFF2-40B4-BE49-F238E27FC236}">
+                <a16:creationId xmlns:a16="http://schemas.microsoft.com/office/drawing/2014/main" id="{34F56F19-3688-4FD9-90B1-6AF71AF4F7AD}"/>
+              </a:ext>
+            </a:extLst>
+          </p:cNvPr>
+          <p:cNvSpPr>
+            <a:spLocks noGrp="1"/>
+          </p:cNvSpPr>
+          <p:nvPr>
+            <p:ph idx="1"/>
+          </p:nvPr>
+        </p:nvSpPr>
+        <p:spPr>
+          <a:xfrm>
+            <a:off x="8114270" y="6249816"/>
+            <a:ext cx="4077730" cy="608184"/>
+          </a:xfrm>
+        </p:spPr>
+        <p:txBody>
+          <a:bodyPr>
+            <a:normAutofit fontScale="92500" lnSpcReduction="10000"/>
+          </a:bodyPr>
+          <a:lstStyle/>
+          <a:p>
+            <a:pPr marL="0" indent="0" algn="ctr">
+              <a:buNone/>
+            </a:pPr>
+            <a:endParaRPr lang="en-US" sz="1800" b="1" dirty="0">
+              <a:latin typeface="Lucida Fax" panose="02060602050505020204" pitchFamily="18" charset="0"/>
+            </a:endParaRPr>
+          </a:p>
+          <a:p>
+            <a:pPr marL="0" indent="0" algn="ctr">
+              <a:buNone/>
+            </a:pPr>
+            <a:r>
+              <a:rPr lang="en-US" sz="1500" b="1" dirty="0">
+                <a:solidFill>
+                  <a:srgbClr val="262626"/>
+                </a:solidFill>
+                <a:latin typeface="Lucida Fax" panose="02060602050505020204" pitchFamily="18" charset="0"/>
+              </a:rPr>
+              <a:t>Big Data Health CSE-6250-O01 - Team 11</a:t>
+            </a:r>
+          </a:p>
+        </p:txBody>
+      </p:sp>
+      <p:sp>
+        <p:nvSpPr>
+          <p:cNvPr id="4" name="Right Triangle 3">
+            <a:extLst>
+              <a:ext uri="{FF2B5EF4-FFF2-40B4-BE49-F238E27FC236}">
+                <a16:creationId xmlns:a16="http://schemas.microsoft.com/office/drawing/2014/main" id="{86ACE1F6-E9A8-44F3-8A3E-1CC3DDCB0936}"/>
+              </a:ext>
+            </a:extLst>
+          </p:cNvPr>
+          <p:cNvSpPr/>
+          <p:nvPr/>
+        </p:nvSpPr>
+        <p:spPr>
+          <a:xfrm rot="5400000">
+            <a:off x="-1960608" y="1960607"/>
+            <a:ext cx="6005387" cy="2084173"/>
+          </a:xfrm>
+          <a:prstGeom prst="rtTriangle">
+            <a:avLst/>
+          </a:prstGeom>
+          <a:solidFill>
+            <a:srgbClr val="EEB211"/>
+          </a:solidFill>
+          <a:ln>
+            <a:noFill/>
+          </a:ln>
+        </p:spPr>
+        <p:style>
+          <a:lnRef idx="2">
+            <a:schemeClr val="accent1">
+              <a:shade val="50000"/>
+            </a:schemeClr>
+          </a:lnRef>
+          <a:fillRef idx="1">
+            <a:schemeClr val="accent1"/>
+          </a:fillRef>
+          <a:effectRef idx="0">
+            <a:schemeClr val="accent1"/>
+          </a:effectRef>
+          <a:fontRef idx="minor">
+            <a:schemeClr val="lt1"/>
+          </a:fontRef>
+        </p:style>
+        <p:txBody>
+          <a:bodyPr rtlCol="0" anchor="ctr"/>
+          <a:lstStyle/>
+          <a:p>
+            <a:pPr algn="ctr"/>
+            <a:endParaRPr lang="en-US" dirty="0"/>
+          </a:p>
+        </p:txBody>
+      </p:sp>
+      <p:pic>
+        <p:nvPicPr>
+          <p:cNvPr id="6" name="Picture 5">
+            <a:extLst>
+              <a:ext uri="{FF2B5EF4-FFF2-40B4-BE49-F238E27FC236}">
+                <a16:creationId xmlns:a16="http://schemas.microsoft.com/office/drawing/2014/main" id="{6D879066-9553-4389-A993-F1410DA706D5}"/>
+              </a:ext>
+            </a:extLst>
+          </p:cNvPr>
+          <p:cNvPicPr>
+            <a:picLocks noChangeAspect="1"/>
+          </p:cNvPicPr>
+          <p:nvPr/>
+        </p:nvPicPr>
+        <p:blipFill>
+          <a:blip r:embed="rId3">
+            <a:extLst>
+              <a:ext uri="{28A0092B-C50C-407E-A947-70E740481C1C}">
+                <a14:useLocalDpi xmlns:a14="http://schemas.microsoft.com/office/drawing/2010/main" val="0"/>
+              </a:ext>
+            </a:extLst>
+          </a:blip>
+          <a:stretch>
+            <a:fillRect/>
+          </a:stretch>
+        </p:blipFill>
+        <p:spPr>
+          <a:xfrm>
+            <a:off x="245075" y="0"/>
+            <a:ext cx="1303638" cy="1303638"/>
+          </a:xfrm>
+          <a:prstGeom prst="rect">
+            <a:avLst/>
+          </a:prstGeom>
+        </p:spPr>
+      </p:pic>
+      <p:pic>
+        <p:nvPicPr>
+          <p:cNvPr id="5" name="Picture 4" descr="A close up of a logo&#10;&#10;Description automatically generated">
+            <a:extLst>
+              <a:ext uri="{FF2B5EF4-FFF2-40B4-BE49-F238E27FC236}">
+                <a16:creationId xmlns:a16="http://schemas.microsoft.com/office/drawing/2014/main" id="{A5942675-D19E-439F-8114-4F26EA3E3F70}"/>
+              </a:ext>
+            </a:extLst>
+          </p:cNvPr>
+          <p:cNvPicPr>
+            <a:picLocks noChangeAspect="1"/>
+          </p:cNvPicPr>
+          <p:nvPr/>
+        </p:nvPicPr>
+        <p:blipFill>
+          <a:blip r:embed="rId4">
+            <a:extLst>
+              <a:ext uri="{28A0092B-C50C-407E-A947-70E740481C1C}">
+                <a14:useLocalDpi xmlns:a14="http://schemas.microsoft.com/office/drawing/2010/main" val="0"/>
+              </a:ext>
+            </a:extLst>
+          </a:blip>
+          <a:stretch>
+            <a:fillRect/>
+          </a:stretch>
+        </p:blipFill>
+        <p:spPr>
+          <a:xfrm>
+            <a:off x="4223195" y="270933"/>
+            <a:ext cx="4649871" cy="4327227"/>
+          </a:xfrm>
+          <a:prstGeom prst="rect">
+            <a:avLst/>
+          </a:prstGeom>
+        </p:spPr>
+      </p:pic>
+      <p:pic>
+        <p:nvPicPr>
+          <p:cNvPr id="8" name="Picture 7" descr="A close up of a logo&#10;&#10;Description automatically generated">
+            <a:extLst>
+              <a:ext uri="{FF2B5EF4-FFF2-40B4-BE49-F238E27FC236}">
+                <a16:creationId xmlns:a16="http://schemas.microsoft.com/office/drawing/2014/main" id="{B06198D5-98F6-415C-8917-84E867728DA0}"/>
+              </a:ext>
+            </a:extLst>
+          </p:cNvPr>
+          <p:cNvPicPr>
+            <a:picLocks noChangeAspect="1"/>
+          </p:cNvPicPr>
+          <p:nvPr/>
+        </p:nvPicPr>
+        <p:blipFill>
+          <a:blip r:embed="rId5">
+            <a:extLst>
+              <a:ext uri="{28A0092B-C50C-407E-A947-70E740481C1C}">
+                <a14:useLocalDpi xmlns:a14="http://schemas.microsoft.com/office/drawing/2010/main" val="0"/>
+              </a:ext>
+            </a:extLst>
+          </a:blip>
+          <a:stretch>
+            <a:fillRect/>
+          </a:stretch>
+        </p:blipFill>
+        <p:spPr>
+          <a:xfrm>
+            <a:off x="2503792" y="4950033"/>
+            <a:ext cx="1299783" cy="1299783"/>
+          </a:xfrm>
+          <a:prstGeom prst="rect">
+            <a:avLst/>
+          </a:prstGeom>
+        </p:spPr>
+      </p:pic>
+      <p:pic>
+        <p:nvPicPr>
+          <p:cNvPr id="10" name="Picture 9" descr="A black sign with white text&#10;&#10;Description automatically generated">
+            <a:extLst>
+              <a:ext uri="{FF2B5EF4-FFF2-40B4-BE49-F238E27FC236}">
+                <a16:creationId xmlns:a16="http://schemas.microsoft.com/office/drawing/2014/main" id="{8B7EA2AF-71DC-4D6D-B929-A5B61A9EA312}"/>
+              </a:ext>
+            </a:extLst>
+          </p:cNvPr>
+          <p:cNvPicPr>
+            <a:picLocks noChangeAspect="1"/>
+          </p:cNvPicPr>
+          <p:nvPr/>
+        </p:nvPicPr>
+        <p:blipFill>
+          <a:blip r:embed="rId6">
+            <a:extLst>
+              <a:ext uri="{28A0092B-C50C-407E-A947-70E740481C1C}">
+                <a14:useLocalDpi xmlns:a14="http://schemas.microsoft.com/office/drawing/2010/main" val="0"/>
+              </a:ext>
+            </a:extLst>
+          </a:blip>
+          <a:stretch>
+            <a:fillRect/>
+          </a:stretch>
+        </p:blipFill>
+        <p:spPr>
+          <a:xfrm>
+            <a:off x="4223194" y="4910929"/>
+            <a:ext cx="1377989" cy="1377989"/>
+          </a:xfrm>
+          <a:prstGeom prst="rect">
+            <a:avLst/>
+          </a:prstGeom>
+        </p:spPr>
+      </p:pic>
+      <p:pic>
+        <p:nvPicPr>
+          <p:cNvPr id="12" name="Picture 11" descr="A close up of a logo&#10;&#10;Description automatically generated">
+            <a:extLst>
+              <a:ext uri="{FF2B5EF4-FFF2-40B4-BE49-F238E27FC236}">
+                <a16:creationId xmlns:a16="http://schemas.microsoft.com/office/drawing/2014/main" id="{CB93B1BD-D1CC-4CC1-A0E7-0C7D7626245A}"/>
+              </a:ext>
+            </a:extLst>
+          </p:cNvPr>
+          <p:cNvPicPr>
+            <a:picLocks noChangeAspect="1"/>
+          </p:cNvPicPr>
+          <p:nvPr/>
+        </p:nvPicPr>
+        <p:blipFill>
+          <a:blip r:embed="rId7">
+            <a:extLst>
+              <a:ext uri="{28A0092B-C50C-407E-A947-70E740481C1C}">
+                <a14:useLocalDpi xmlns:a14="http://schemas.microsoft.com/office/drawing/2010/main" val="0"/>
+              </a:ext>
+            </a:extLst>
+          </a:blip>
+          <a:stretch>
+            <a:fillRect/>
+          </a:stretch>
+        </p:blipFill>
+        <p:spPr>
+          <a:xfrm>
+            <a:off x="1051596" y="4893348"/>
+            <a:ext cx="1032577" cy="1356468"/>
+          </a:xfrm>
+          <a:prstGeom prst="rect">
+            <a:avLst/>
+          </a:prstGeom>
+        </p:spPr>
+      </p:pic>
+    </p:spTree>
+    <p:extLst>
+      <p:ext uri="{BB962C8B-B14F-4D97-AF65-F5344CB8AC3E}">
+        <p14:creationId xmlns:p14="http://schemas.microsoft.com/office/powerpoint/2010/main" val="3339875453"/>
+      </p:ext>
+    </p:extLst>
+  </p:cSld>
+  <p:clrMapOvr>
+    <a:masterClrMapping/>
+  </p:clrMapOvr>
+</p:sld>
+</file>
+
+<file path=ppt/slides/slide47.xml><?xml version="1.0" encoding="utf-8"?>
+<p:sld xmlns:a="http://schemas.openxmlformats.org/drawingml/2006/main" xmlns:r="http://schemas.openxmlformats.org/officeDocument/2006/relationships" xmlns:p="http://schemas.openxmlformats.org/presentationml/2006/main">
+  <p:cSld>
+    <p:spTree>
+      <p:nvGrpSpPr>
+        <p:cNvPr id="1" name=""/>
+        <p:cNvGrpSpPr/>
+        <p:nvPr/>
+      </p:nvGrpSpPr>
+      <p:grpSpPr>
+        <a:xfrm>
+          <a:off x="0" y="0"/>
+          <a:ext cx="0" cy="0"/>
+          <a:chOff x="0" y="0"/>
+          <a:chExt cx="0" cy="0"/>
+        </a:xfrm>
+      </p:grpSpPr>
+      <p:sp>
+        <p:nvSpPr>
+          <p:cNvPr id="3" name="Content Placeholder 2">
+            <a:extLst>
+              <a:ext uri="{FF2B5EF4-FFF2-40B4-BE49-F238E27FC236}">
+                <a16:creationId xmlns:a16="http://schemas.microsoft.com/office/drawing/2014/main" id="{34F56F19-3688-4FD9-90B1-6AF71AF4F7AD}"/>
+              </a:ext>
+            </a:extLst>
+          </p:cNvPr>
+          <p:cNvSpPr>
+            <a:spLocks noGrp="1"/>
+          </p:cNvSpPr>
+          <p:nvPr>
+            <p:ph idx="1"/>
+          </p:nvPr>
+        </p:nvSpPr>
+        <p:spPr>
+          <a:xfrm>
+            <a:off x="8114270" y="6249816"/>
+            <a:ext cx="4077730" cy="608184"/>
+          </a:xfrm>
+        </p:spPr>
+        <p:txBody>
+          <a:bodyPr>
+            <a:normAutofit fontScale="92500" lnSpcReduction="10000"/>
+          </a:bodyPr>
+          <a:lstStyle/>
+          <a:p>
+            <a:pPr marL="0" indent="0" algn="ctr">
+              <a:buNone/>
+            </a:pPr>
+            <a:endParaRPr lang="en-US" sz="1800" b="1" dirty="0">
+              <a:latin typeface="Lucida Fax" panose="02060602050505020204" pitchFamily="18" charset="0"/>
+            </a:endParaRPr>
+          </a:p>
+          <a:p>
+            <a:pPr marL="0" indent="0" algn="ctr">
+              <a:buNone/>
+            </a:pPr>
+            <a:r>
+              <a:rPr lang="en-US" sz="1500" b="1" dirty="0">
+                <a:solidFill>
+                  <a:srgbClr val="262626"/>
+                </a:solidFill>
+                <a:latin typeface="Lucida Fax" panose="02060602050505020204" pitchFamily="18" charset="0"/>
+              </a:rPr>
+              <a:t>Big Data Health CSE-6250-O01 - Team 11</a:t>
+            </a:r>
+          </a:p>
+        </p:txBody>
+      </p:sp>
+      <p:sp>
+        <p:nvSpPr>
+          <p:cNvPr id="4" name="Right Triangle 3">
+            <a:extLst>
+              <a:ext uri="{FF2B5EF4-FFF2-40B4-BE49-F238E27FC236}">
+                <a16:creationId xmlns:a16="http://schemas.microsoft.com/office/drawing/2014/main" id="{86ACE1F6-E9A8-44F3-8A3E-1CC3DDCB0936}"/>
+              </a:ext>
+            </a:extLst>
+          </p:cNvPr>
+          <p:cNvSpPr/>
+          <p:nvPr/>
+        </p:nvSpPr>
+        <p:spPr>
+          <a:xfrm rot="5400000">
+            <a:off x="-1960608" y="1960607"/>
+            <a:ext cx="6005387" cy="2084173"/>
+          </a:xfrm>
+          <a:prstGeom prst="rtTriangle">
+            <a:avLst/>
+          </a:prstGeom>
+          <a:solidFill>
+            <a:srgbClr val="EEB211"/>
+          </a:solidFill>
+          <a:ln>
+            <a:noFill/>
+          </a:ln>
+        </p:spPr>
+        <p:style>
+          <a:lnRef idx="2">
+            <a:schemeClr val="accent1">
+              <a:shade val="50000"/>
+            </a:schemeClr>
+          </a:lnRef>
+          <a:fillRef idx="1">
+            <a:schemeClr val="accent1"/>
+          </a:fillRef>
+          <a:effectRef idx="0">
+            <a:schemeClr val="accent1"/>
+          </a:effectRef>
+          <a:fontRef idx="minor">
+            <a:schemeClr val="lt1"/>
+          </a:fontRef>
+        </p:style>
+        <p:txBody>
+          <a:bodyPr rtlCol="0" anchor="ctr"/>
+          <a:lstStyle/>
+          <a:p>
+            <a:pPr algn="ctr"/>
+            <a:endParaRPr lang="en-US" dirty="0"/>
+          </a:p>
+        </p:txBody>
+      </p:sp>
+      <p:pic>
+        <p:nvPicPr>
+          <p:cNvPr id="6" name="Picture 5">
+            <a:extLst>
+              <a:ext uri="{FF2B5EF4-FFF2-40B4-BE49-F238E27FC236}">
+                <a16:creationId xmlns:a16="http://schemas.microsoft.com/office/drawing/2014/main" id="{6D879066-9553-4389-A993-F1410DA706D5}"/>
+              </a:ext>
+            </a:extLst>
+          </p:cNvPr>
+          <p:cNvPicPr>
+            <a:picLocks noChangeAspect="1"/>
+          </p:cNvPicPr>
+          <p:nvPr/>
+        </p:nvPicPr>
+        <p:blipFill>
+          <a:blip r:embed="rId3">
+            <a:extLst>
+              <a:ext uri="{28A0092B-C50C-407E-A947-70E740481C1C}">
+                <a14:useLocalDpi xmlns:a14="http://schemas.microsoft.com/office/drawing/2010/main" val="0"/>
+              </a:ext>
+            </a:extLst>
+          </a:blip>
+          <a:stretch>
+            <a:fillRect/>
+          </a:stretch>
+        </p:blipFill>
+        <p:spPr>
+          <a:xfrm>
+            <a:off x="245075" y="0"/>
+            <a:ext cx="1303638" cy="1303638"/>
+          </a:xfrm>
+          <a:prstGeom prst="rect">
+            <a:avLst/>
+          </a:prstGeom>
+        </p:spPr>
+      </p:pic>
+      <p:pic>
+        <p:nvPicPr>
+          <p:cNvPr id="2" name="Picture 1">
+            <a:extLst>
+              <a:ext uri="{FF2B5EF4-FFF2-40B4-BE49-F238E27FC236}">
+                <a16:creationId xmlns:a16="http://schemas.microsoft.com/office/drawing/2014/main" id="{EEE90D72-7295-4FFF-B540-DB2B2681776A}"/>
+              </a:ext>
+            </a:extLst>
+          </p:cNvPr>
+          <p:cNvPicPr>
+            <a:picLocks noChangeAspect="1"/>
+          </p:cNvPicPr>
+          <p:nvPr/>
+        </p:nvPicPr>
+        <p:blipFill>
+          <a:blip r:embed="rId4"/>
+          <a:stretch>
+            <a:fillRect/>
+          </a:stretch>
+        </p:blipFill>
+        <p:spPr>
+          <a:xfrm>
+            <a:off x="4736042" y="2670704"/>
+            <a:ext cx="3905250" cy="1076325"/>
+          </a:xfrm>
+          <a:prstGeom prst="rect">
+            <a:avLst/>
+          </a:prstGeom>
+        </p:spPr>
+      </p:pic>
+    </p:spTree>
+    <p:extLst>
+      <p:ext uri="{BB962C8B-B14F-4D97-AF65-F5344CB8AC3E}">
+        <p14:creationId xmlns:p14="http://schemas.microsoft.com/office/powerpoint/2010/main" val="4087345438"/>
       </p:ext>
     </p:extLst>
   </p:cSld>

</xml_diff>